<commit_message>
Removed un-needed slides. Added introduction and conclusion slides.
</commit_message>
<xml_diff>
--- a/Documents/PresentationSpring/Spring Presentation.pptx
+++ b/Documents/PresentationSpring/Spring Presentation.pptx
@@ -5,19 +5,12 @@
     <p:sldMasterId id="2147483674" r:id="rId1"/>
   </p:sldMasterIdLst>
   <p:notesMasterIdLst>
-    <p:notesMasterId r:id="rId12"/>
+    <p:notesMasterId r:id="rId5"/>
   </p:notesMasterIdLst>
   <p:sldIdLst>
     <p:sldId id="256" r:id="rId2"/>
     <p:sldId id="257" r:id="rId3"/>
-    <p:sldId id="258" r:id="rId4"/>
-    <p:sldId id="259" r:id="rId5"/>
-    <p:sldId id="260" r:id="rId6"/>
-    <p:sldId id="261" r:id="rId7"/>
-    <p:sldId id="262" r:id="rId8"/>
-    <p:sldId id="263" r:id="rId9"/>
-    <p:sldId id="264" r:id="rId10"/>
-    <p:sldId id="265" r:id="rId11"/>
+    <p:sldId id="265" r:id="rId4"/>
   </p:sldIdLst>
   <p:sldSz cx="12192000" cy="6858000"/>
   <p:notesSz cx="7772400" cy="10058400"/>
@@ -116,11 +109,12 @@
       </a:defRPr>
     </a:lvl9pPr>
   </p:defaultTextStyle>
+  <p:extLst>
+    <p:ext uri="{EFAFB233-063F-42B5-8137-9DF3F51BA10A}">
+      <p15:sldGuideLst xmlns:p15="http://schemas.microsoft.com/office/powerpoint/2012/main"/>
+    </p:ext>
+  </p:extLst>
 </p:presentation>
-</file>
-
-<file path=ppt/revisionInfo.xml><?xml version="1.0" encoding="utf-8"?>
-<p1510:revInfo xmlns:a="http://schemas.openxmlformats.org/drawingml/2006/main" xmlns:r="http://schemas.openxmlformats.org/officeDocument/2006/relationships" xmlns:p1510="http://schemas.microsoft.com/office/powerpoint/2015/10/main"/>
 </file>
 
 <file path=ppt/notesMasters/notesMaster1.xml><?xml version="1.0" encoding="utf-8"?>
@@ -454,125 +448,6 @@
     </a:lvl9pPr>
   </p:notesStyle>
 </p:notesMaster>
-</file>
-
-<file path=ppt/notesSlides/notesSlide1.xml><?xml version="1.0" encoding="utf-8"?>
-<p:notes xmlns:a="http://schemas.openxmlformats.org/drawingml/2006/main" xmlns:r="http://schemas.openxmlformats.org/officeDocument/2006/relationships" xmlns:p="http://schemas.openxmlformats.org/presentationml/2006/main">
-  <p:cSld>
-    <p:spTree>
-      <p:nvGrpSpPr>
-        <p:cNvPr id="1" name=""/>
-        <p:cNvGrpSpPr/>
-        <p:nvPr/>
-      </p:nvGrpSpPr>
-      <p:grpSpPr>
-        <a:xfrm>
-          <a:off x="0" y="0"/>
-          <a:ext cx="0" cy="0"/>
-          <a:chOff x="0" y="0"/>
-          <a:chExt cx="0" cy="0"/>
-        </a:xfrm>
-      </p:grpSpPr>
-      <p:sp>
-        <p:nvSpPr>
-          <p:cNvPr id="138" name="PlaceHolder 1"/>
-          <p:cNvSpPr>
-            <a:spLocks noGrp="1"/>
-          </p:cNvSpPr>
-          <p:nvPr>
-            <p:ph type="body"/>
-          </p:nvPr>
-        </p:nvSpPr>
-        <p:spPr>
-          <a:xfrm>
-            <a:off x="777240" y="4777560"/>
-            <a:ext cx="6217200" cy="4525560"/>
-          </a:xfrm>
-          <a:prstGeom prst="rect">
-            <a:avLst/>
-          </a:prstGeom>
-        </p:spPr>
-        <p:txBody>
-          <a:bodyPr lIns="0" tIns="0" rIns="0" bIns="0"/>
-          <a:lstStyle/>
-          <a:p>
-            <a:endParaRPr lang="en-US" sz="2000" b="0" strike="noStrike" spc="-1">
-              <a:solidFill>
-                <a:srgbClr val="000000"/>
-              </a:solidFill>
-              <a:uFill>
-                <a:solidFill>
-                  <a:srgbClr val="FFFFFF"/>
-                </a:solidFill>
-              </a:uFill>
-              <a:latin typeface="Arial"/>
-            </a:endParaRPr>
-          </a:p>
-        </p:txBody>
-      </p:sp>
-      <p:sp>
-        <p:nvSpPr>
-          <p:cNvPr id="139" name="TextShape 2"/>
-          <p:cNvSpPr txBox="1"/>
-          <p:nvPr/>
-        </p:nvSpPr>
-        <p:spPr>
-          <a:xfrm>
-            <a:off x="4399200" y="9555480"/>
-            <a:ext cx="3372480" cy="502200"/>
-          </a:xfrm>
-          <a:prstGeom prst="rect">
-            <a:avLst/>
-          </a:prstGeom>
-          <a:noFill/>
-          <a:ln>
-            <a:noFill/>
-          </a:ln>
-        </p:spPr>
-        <p:txBody>
-          <a:bodyPr lIns="0" tIns="0" rIns="0" bIns="0" anchor="b"/>
-          <a:lstStyle/>
-          <a:p>
-            <a:pPr algn="r">
-              <a:lnSpc>
-                <a:spcPct val="100000"/>
-              </a:lnSpc>
-            </a:pPr>
-            <a:fld id="{50990FFB-2710-4FBD-9753-DB0407FD72C7}" type="slidenum">
-              <a:rPr lang="en-US" sz="1400" b="0" strike="noStrike" spc="-1">
-                <a:solidFill>
-                  <a:srgbClr val="000000"/>
-                </a:solidFill>
-                <a:uFill>
-                  <a:solidFill>
-                    <a:srgbClr val="FFFFFF"/>
-                  </a:solidFill>
-                </a:uFill>
-                <a:latin typeface="Times New Roman"/>
-                <a:ea typeface="+mn-ea"/>
-              </a:rPr>
-              <a:t>6</a:t>
-            </a:fld>
-            <a:endParaRPr lang="en-US" sz="1400" b="0" strike="noStrike" spc="-1">
-              <a:solidFill>
-                <a:srgbClr val="000000"/>
-              </a:solidFill>
-              <a:uFill>
-                <a:solidFill>
-                  <a:srgbClr val="FFFFFF"/>
-                </a:solidFill>
-              </a:uFill>
-              <a:latin typeface="Times New Roman"/>
-            </a:endParaRPr>
-          </a:p>
-        </p:txBody>
-      </p:sp>
-    </p:spTree>
-  </p:cSld>
-  <p:clrMapOvr>
-    <a:masterClrMapping/>
-  </p:clrMapOvr>
-</p:notes>
 </file>
 
 <file path=ppt/slideLayouts/slideLayout1.xml><?xml version="1.0" encoding="utf-8"?>
@@ -1298,7 +1173,7 @@
             <a:fld id="{B61BEF0D-F0BB-DE4B-95CE-6DB70DBA9567}" type="datetimeFigureOut">
               <a:rPr lang="en-US" dirty="0"/>
               <a:pPr/>
-              <a:t>2/16/2018</a:t>
+              <a:t>5/4/2018</a:t>
             </a:fld>
             <a:endParaRPr lang="en-US" dirty="0"/>
           </a:p>
@@ -1565,7 +1440,7 @@
                 </a:uFill>
                 <a:latin typeface="Trebuchet MS"/>
               </a:rPr>
-              <a:t>2/16/2018</a:t>
+              <a:t>5/4/2018</a:t>
             </a:fld>
             <a:endParaRPr lang="en-US" sz="900" b="0" strike="noStrike" spc="-1">
               <a:solidFill>
@@ -1939,7 +1814,7 @@
                 </a:uFill>
                 <a:latin typeface="Trebuchet MS"/>
               </a:rPr>
-              <a:t>2/16/2018</a:t>
+              <a:t>5/4/2018</a:t>
             </a:fld>
             <a:endParaRPr lang="en-US" sz="900" b="0" strike="noStrike" spc="-1">
               <a:solidFill>
@@ -2340,7 +2215,7 @@
                 </a:uFill>
                 <a:latin typeface="Trebuchet MS"/>
               </a:rPr>
-              <a:t>2/16/2018</a:t>
+              <a:t>5/4/2018</a:t>
             </a:fld>
             <a:endParaRPr lang="en-US" sz="900" b="0" strike="noStrike" spc="-1">
               <a:solidFill>
@@ -2714,7 +2589,7 @@
                 </a:uFill>
                 <a:latin typeface="Trebuchet MS"/>
               </a:rPr>
-              <a:t>2/16/2018</a:t>
+              <a:t>5/4/2018</a:t>
             </a:fld>
             <a:endParaRPr lang="en-US" sz="900" b="0" strike="noStrike" spc="-1">
               <a:solidFill>
@@ -3167,7 +3042,7 @@
                 </a:uFill>
                 <a:latin typeface="Trebuchet MS"/>
               </a:rPr>
-              <a:t>2/16/2018</a:t>
+              <a:t>5/4/2018</a:t>
             </a:fld>
             <a:endParaRPr lang="en-US" sz="900" b="0" strike="noStrike" spc="-1">
               <a:solidFill>
@@ -3397,7 +3272,7 @@
                 </a:uFill>
                 <a:latin typeface="Trebuchet MS"/>
               </a:rPr>
-              <a:t>2/16/2018</a:t>
+              <a:t>5/4/2018</a:t>
             </a:fld>
             <a:endParaRPr lang="en-US" sz="900" b="0" strike="noStrike" spc="-1">
               <a:solidFill>
@@ -3637,7 +3512,7 @@
                 </a:uFill>
                 <a:latin typeface="Trebuchet MS"/>
               </a:rPr>
-              <a:t>2/16/2018</a:t>
+              <a:t>5/4/2018</a:t>
             </a:fld>
             <a:endParaRPr lang="en-US" sz="900" b="0" strike="noStrike" spc="-1">
               <a:solidFill>
@@ -3873,7 +3748,7 @@
                 </a:uFill>
                 <a:latin typeface="Trebuchet MS"/>
               </a:rPr>
-              <a:t>2/16/2018</a:t>
+              <a:t>5/4/2018</a:t>
             </a:fld>
             <a:endParaRPr lang="en-US" sz="900" b="0" strike="noStrike" spc="-1">
               <a:solidFill>
@@ -4180,7 +4055,7 @@
                 </a:uFill>
                 <a:latin typeface="Trebuchet MS"/>
               </a:rPr>
-              <a:t>2/16/2018</a:t>
+              <a:t>5/4/2018</a:t>
             </a:fld>
             <a:endParaRPr lang="en-US" sz="900" b="0" strike="noStrike" spc="-1">
               <a:solidFill>
@@ -4472,7 +4347,7 @@
                 </a:uFill>
                 <a:latin typeface="Trebuchet MS"/>
               </a:rPr>
-              <a:t>2/16/2018</a:t>
+              <a:t>5/4/2018</a:t>
             </a:fld>
             <a:endParaRPr lang="en-US" sz="900" b="0" strike="noStrike" spc="-1">
               <a:solidFill>
@@ -4906,7 +4781,7 @@
                 </a:uFill>
                 <a:latin typeface="Trebuchet MS"/>
               </a:rPr>
-              <a:t>2/16/2018</a:t>
+              <a:t>5/4/2018</a:t>
             </a:fld>
             <a:endParaRPr lang="en-US" sz="900" b="0" strike="noStrike" spc="-1">
               <a:solidFill>
@@ -5075,7 +4950,7 @@
             <a:fld id="{B61BEF0D-F0BB-DE4B-95CE-6DB70DBA9567}" type="datetimeFigureOut">
               <a:rPr lang="en-US" dirty="0"/>
               <a:pPr/>
-              <a:t>2/16/2018</a:t>
+              <a:t>5/4/2018</a:t>
             </a:fld>
             <a:endParaRPr lang="en-US" dirty="0"/>
           </a:p>
@@ -5186,7 +5061,7 @@
                 </a:uFill>
                 <a:latin typeface="Trebuchet MS"/>
               </a:rPr>
-              <a:t>2/16/2018</a:t>
+              <a:t>5/4/2018</a:t>
             </a:fld>
             <a:endParaRPr lang="en-US" sz="900" b="0" strike="noStrike" spc="-1">
               <a:solidFill>
@@ -5501,7 +5376,7 @@
                 </a:uFill>
                 <a:latin typeface="Trebuchet MS"/>
               </a:rPr>
-              <a:t>2/16/2018</a:t>
+              <a:t>5/4/2018</a:t>
             </a:fld>
             <a:endParaRPr lang="en-US" sz="900" b="0" strike="noStrike" spc="-1">
               <a:solidFill>
@@ -5824,7 +5699,7 @@
                 </a:uFill>
                 <a:latin typeface="Trebuchet MS"/>
               </a:rPr>
-              <a:t>2/16/2018</a:t>
+              <a:t>5/4/2018</a:t>
             </a:fld>
             <a:endParaRPr lang="en-US" sz="900" b="0" strike="noStrike" spc="-1">
               <a:solidFill>
@@ -6627,7 +6502,7 @@
                 </a:uFill>
                 <a:latin typeface="Trebuchet MS"/>
               </a:rPr>
-              <a:t>2/16/2018</a:t>
+              <a:t>5/4/2018</a:t>
             </a:fld>
             <a:endParaRPr lang="en-US" sz="900" b="0" strike="noStrike" spc="-1">
               <a:solidFill>
@@ -7500,348 +7375,6 @@
 </p:sld>
 </file>
 
-<file path=ppt/slides/slide10.xml><?xml version="1.0" encoding="utf-8"?>
-<p:sld xmlns:a="http://schemas.openxmlformats.org/drawingml/2006/main" xmlns:r="http://schemas.openxmlformats.org/officeDocument/2006/relationships" xmlns:p="http://schemas.openxmlformats.org/presentationml/2006/main">
-  <p:cSld>
-    <p:spTree>
-      <p:nvGrpSpPr>
-        <p:cNvPr id="1" name=""/>
-        <p:cNvGrpSpPr/>
-        <p:nvPr/>
-      </p:nvGrpSpPr>
-      <p:grpSpPr>
-        <a:xfrm>
-          <a:off x="0" y="0"/>
-          <a:ext cx="0" cy="0"/>
-          <a:chOff x="0" y="0"/>
-          <a:chExt cx="0" cy="0"/>
-        </a:xfrm>
-      </p:grpSpPr>
-      <p:sp>
-        <p:nvSpPr>
-          <p:cNvPr id="136" name="TextShape 1"/>
-          <p:cNvSpPr txBox="1"/>
-          <p:nvPr/>
-        </p:nvSpPr>
-        <p:spPr>
-          <a:xfrm>
-            <a:off x="677160" y="590760"/>
-            <a:ext cx="8596440" cy="1320480"/>
-          </a:xfrm>
-          <a:prstGeom prst="rect">
-            <a:avLst/>
-          </a:prstGeom>
-          <a:noFill/>
-          <a:ln>
-            <a:noFill/>
-          </a:ln>
-        </p:spPr>
-        <p:txBody>
-          <a:bodyPr/>
-          <a:lstStyle/>
-          <a:p>
-            <a:pPr>
-              <a:lnSpc>
-                <a:spcPct val="100000"/>
-              </a:lnSpc>
-            </a:pPr>
-            <a:r>
-              <a:rPr lang="en-US" sz="3600" b="0" strike="noStrike" spc="-1">
-                <a:solidFill>
-                  <a:srgbClr val="90C226"/>
-                </a:solidFill>
-                <a:uFill>
-                  <a:solidFill>
-                    <a:srgbClr val="FFFFFF"/>
-                  </a:solidFill>
-                </a:uFill>
-                <a:latin typeface="Trebuchet MS"/>
-              </a:rPr>
-              <a:t>Moving Forward</a:t>
-            </a:r>
-            <a:endParaRPr lang="en-US" sz="3600" b="0" strike="noStrike" spc="-1">
-              <a:solidFill>
-                <a:srgbClr val="000000"/>
-              </a:solidFill>
-              <a:uFill>
-                <a:solidFill>
-                  <a:srgbClr val="FFFFFF"/>
-                </a:solidFill>
-              </a:uFill>
-              <a:latin typeface="Trebuchet MS"/>
-            </a:endParaRPr>
-          </a:p>
-        </p:txBody>
-      </p:sp>
-      <p:sp>
-        <p:nvSpPr>
-          <p:cNvPr id="137" name="TextShape 2"/>
-          <p:cNvSpPr txBox="1"/>
-          <p:nvPr/>
-        </p:nvSpPr>
-        <p:spPr>
-          <a:xfrm>
-            <a:off x="677160" y="2160720"/>
-            <a:ext cx="8596440" cy="3880440"/>
-          </a:xfrm>
-          <a:prstGeom prst="rect">
-            <a:avLst/>
-          </a:prstGeom>
-          <a:noFill/>
-          <a:ln>
-            <a:noFill/>
-          </a:ln>
-        </p:spPr>
-        <p:txBody>
-          <a:bodyPr/>
-          <a:lstStyle/>
-          <a:p>
-            <a:pPr marL="343080" indent="-342720">
-              <a:lnSpc>
-                <a:spcPct val="100000"/>
-              </a:lnSpc>
-              <a:spcBef>
-                <a:spcPts val="1001"/>
-              </a:spcBef>
-              <a:buClr>
-                <a:srgbClr val="90C226"/>
-              </a:buClr>
-              <a:buSzPct val="80000"/>
-              <a:buFont typeface="Wingdings 3" charset="2"/>
-              <a:buChar char=""/>
-            </a:pPr>
-            <a:r>
-              <a:rPr lang="en-US" sz="1800" b="0" strike="noStrike" spc="-1">
-                <a:solidFill>
-                  <a:srgbClr val="404040"/>
-                </a:solidFill>
-                <a:uFill>
-                  <a:solidFill>
-                    <a:srgbClr val="FFFFFF"/>
-                  </a:solidFill>
-                </a:uFill>
-                <a:latin typeface="Trebuchet MS"/>
-              </a:rPr>
-              <a:t>Data Parser</a:t>
-            </a:r>
-            <a:br/>
-            <a:r>
-              <a:rPr lang="en-US" sz="1800" b="0" strike="noStrike" spc="-1">
-                <a:solidFill>
-                  <a:srgbClr val="404040"/>
-                </a:solidFill>
-                <a:uFill>
-                  <a:solidFill>
-                    <a:srgbClr val="FFFFFF"/>
-                  </a:solidFill>
-                </a:uFill>
-                <a:latin typeface="Trebuchet MS"/>
-              </a:rPr>
-              <a:t> </a:t>
-            </a:r>
-          </a:p>
-          <a:p>
-            <a:pPr marL="343080" indent="-342720">
-              <a:lnSpc>
-                <a:spcPct val="100000"/>
-              </a:lnSpc>
-              <a:spcBef>
-                <a:spcPts val="1001"/>
-              </a:spcBef>
-              <a:buClr>
-                <a:srgbClr val="90C226"/>
-              </a:buClr>
-              <a:buSzPct val="80000"/>
-              <a:buFont typeface="Wingdings 3" charset="2"/>
-              <a:buChar char=""/>
-            </a:pPr>
-            <a:r>
-              <a:rPr lang="en-US" sz="1800" b="0" strike="noStrike" spc="-1">
-                <a:solidFill>
-                  <a:srgbClr val="404040"/>
-                </a:solidFill>
-                <a:uFill>
-                  <a:solidFill>
-                    <a:srgbClr val="FFFFFF"/>
-                  </a:solidFill>
-                </a:uFill>
-                <a:latin typeface="Trebuchet MS"/>
-              </a:rPr>
-              <a:t>Web Interface</a:t>
-            </a:r>
-            <a:br/>
-            <a:r>
-              <a:rPr lang="en-US" sz="1800" b="0" strike="noStrike" spc="-1">
-                <a:solidFill>
-                  <a:srgbClr val="404040"/>
-                </a:solidFill>
-                <a:uFill>
-                  <a:solidFill>
-                    <a:srgbClr val="FFFFFF"/>
-                  </a:solidFill>
-                </a:uFill>
-                <a:latin typeface="Trebuchet MS"/>
-              </a:rPr>
-              <a:t> </a:t>
-            </a:r>
-          </a:p>
-          <a:p>
-            <a:pPr marL="343080" indent="-342720">
-              <a:lnSpc>
-                <a:spcPct val="100000"/>
-              </a:lnSpc>
-              <a:spcBef>
-                <a:spcPts val="1001"/>
-              </a:spcBef>
-              <a:buClr>
-                <a:srgbClr val="90C226"/>
-              </a:buClr>
-              <a:buSzPct val="80000"/>
-              <a:buFont typeface="Wingdings 3" charset="2"/>
-              <a:buChar char=""/>
-            </a:pPr>
-            <a:r>
-              <a:rPr lang="en-US" sz="1800" b="0" strike="noStrike" spc="-1">
-                <a:solidFill>
-                  <a:srgbClr val="404040"/>
-                </a:solidFill>
-                <a:uFill>
-                  <a:solidFill>
-                    <a:srgbClr val="FFFFFF"/>
-                  </a:solidFill>
-                </a:uFill>
-                <a:latin typeface="Trebuchet MS"/>
-              </a:rPr>
-              <a:t>Multiple Arduino Controllers w/ LED Strips</a:t>
-            </a:r>
-            <a:br/>
-            <a:r>
-              <a:rPr lang="en-US" sz="1800" b="0" strike="noStrike" spc="-1">
-                <a:solidFill>
-                  <a:srgbClr val="404040"/>
-                </a:solidFill>
-                <a:uFill>
-                  <a:solidFill>
-                    <a:srgbClr val="FFFFFF"/>
-                  </a:solidFill>
-                </a:uFill>
-                <a:latin typeface="Trebuchet MS"/>
-              </a:rPr>
-              <a:t> </a:t>
-            </a:r>
-          </a:p>
-          <a:p>
-            <a:pPr marL="343080" indent="-342720">
-              <a:lnSpc>
-                <a:spcPct val="100000"/>
-              </a:lnSpc>
-              <a:spcBef>
-                <a:spcPts val="1001"/>
-              </a:spcBef>
-              <a:buClr>
-                <a:srgbClr val="90C226"/>
-              </a:buClr>
-              <a:buSzPct val="80000"/>
-              <a:buFont typeface="Wingdings 3" charset="2"/>
-              <a:buChar char=""/>
-            </a:pPr>
-            <a:r>
-              <a:rPr lang="en-US" sz="1800" b="0" strike="noStrike" spc="-1">
-                <a:solidFill>
-                  <a:srgbClr val="404040"/>
-                </a:solidFill>
-                <a:uFill>
-                  <a:solidFill>
-                    <a:srgbClr val="FFFFFF"/>
-                  </a:solidFill>
-                </a:uFill>
-                <a:latin typeface="Trebuchet MS"/>
-              </a:rPr>
-              <a:t>Mass System Testing</a:t>
-            </a:r>
-            <a:br/>
-            <a:r>
-              <a:rPr lang="en-US" sz="1800" b="0" strike="noStrike" spc="-1">
-                <a:solidFill>
-                  <a:srgbClr val="404040"/>
-                </a:solidFill>
-                <a:uFill>
-                  <a:solidFill>
-                    <a:srgbClr val="FFFFFF"/>
-                  </a:solidFill>
-                </a:uFill>
-                <a:latin typeface="Trebuchet MS"/>
-              </a:rPr>
-              <a:t> </a:t>
-            </a:r>
-          </a:p>
-          <a:p>
-            <a:pPr marL="343080" indent="-342720">
-              <a:lnSpc>
-                <a:spcPct val="100000"/>
-              </a:lnSpc>
-              <a:spcBef>
-                <a:spcPts val="1001"/>
-              </a:spcBef>
-              <a:buClr>
-                <a:srgbClr val="90C226"/>
-              </a:buClr>
-              <a:buSzPct val="80000"/>
-              <a:buFont typeface="Wingdings 3" charset="2"/>
-              <a:buChar char=""/>
-            </a:pPr>
-            <a:r>
-              <a:rPr lang="en-US" sz="1800" b="0" strike="noStrike" spc="-1">
-                <a:solidFill>
-                  <a:srgbClr val="404040"/>
-                </a:solidFill>
-                <a:uFill>
-                  <a:solidFill>
-                    <a:srgbClr val="FFFFFF"/>
-                  </a:solidFill>
-                </a:uFill>
-                <a:latin typeface="Trebuchet MS"/>
-              </a:rPr>
-              <a:t>Bug Smashing</a:t>
-            </a:r>
-          </a:p>
-        </p:txBody>
-      </p:sp>
-    </p:spTree>
-  </p:cSld>
-  <p:clrMapOvr>
-    <a:masterClrMapping/>
-  </p:clrMapOvr>
-  <p:timing>
-    <p:tnLst>
-      <p:par>
-        <p:cTn id="1" dur="indefinite" restart="never" nodeType="tmRoot">
-          <p:childTnLst>
-            <p:seq>
-              <p:cTn id="2" nodeType="mainSeq"/>
-              <p:prevCondLst>
-                <p:cond evt="onPrev" delay="0">
-                  <p:tgtEl>
-                    <p:sldTgt/>
-                  </p:tgtEl>
-                </p:cond>
-              </p:prevCondLst>
-              <p:nextCondLst>
-                <p:cond evt="onNext" delay="0">
-                  <p:tgtEl>
-                    <p:sldTgt/>
-                  </p:tgtEl>
-                </p:cond>
-              </p:nextCondLst>
-            </p:seq>
-          </p:childTnLst>
-        </p:cTn>
-      </p:par>
-    </p:tnLst>
-  </p:timing>
-</p:sld>
-</file>
-
 <file path=ppt/slides/slide2.xml><?xml version="1.0" encoding="utf-8"?>
 <p:sld xmlns:a="http://schemas.openxmlformats.org/drawingml/2006/main" xmlns:r="http://schemas.openxmlformats.org/officeDocument/2006/relationships" xmlns:p="http://schemas.openxmlformats.org/presentationml/2006/main">
   <p:cSld>
@@ -7888,7 +7421,7 @@
               </a:lnSpc>
             </a:pPr>
             <a:r>
-              <a:rPr lang="en-US" sz="3600" b="0" strike="noStrike" spc="-1">
+              <a:rPr lang="en-US" sz="3600" b="0" strike="noStrike" spc="-1" dirty="0">
                 <a:solidFill>
                   <a:srgbClr val="90C226"/>
                 </a:solidFill>
@@ -7899,9 +7432,9 @@
                 </a:uFill>
                 <a:latin typeface="Trebuchet MS"/>
               </a:rPr>
-              <a:t>Overview</a:t>
-            </a:r>
-            <a:endParaRPr lang="en-US" sz="3600" b="0" strike="noStrike" spc="-1">
+              <a:t>Introduction</a:t>
+            </a:r>
+            <a:endParaRPr lang="en-US" sz="3600" b="0" strike="noStrike" spc="-1" dirty="0">
               <a:solidFill>
                 <a:srgbClr val="000000"/>
               </a:solidFill>
@@ -7923,8 +7456,8 @@
         </p:nvSpPr>
         <p:spPr>
           <a:xfrm>
-            <a:off x="677160" y="1270080"/>
-            <a:ext cx="8596440" cy="5466240"/>
+            <a:off x="677160" y="1934867"/>
+            <a:ext cx="9798335" cy="3317962"/>
           </a:xfrm>
           <a:prstGeom prst="rect">
             <a:avLst/>
@@ -7955,7 +7488,7 @@
               <a:buChar char=""/>
             </a:pPr>
             <a:r>
-              <a:rPr lang="en-US" sz="1800" b="0" strike="noStrike" spc="-1">
+              <a:rPr lang="en-US" sz="1800" b="0" strike="noStrike" spc="-1" dirty="0">
                 <a:solidFill>
                   <a:srgbClr val="404040"/>
                 </a:solidFill>
@@ -7966,37 +7499,7 @@
                 </a:uFill>
                 <a:latin typeface="Trebuchet MS"/>
               </a:rPr>
-              <a:t>Recap</a:t>
-            </a:r>
-          </a:p>
-          <a:p>
-            <a:pPr marL="743040" lvl="1" indent="-285480">
-              <a:lnSpc>
-                <a:spcPct val="120000"/>
-              </a:lnSpc>
-              <a:spcBef>
-                <a:spcPts val="1001"/>
-              </a:spcBef>
-              <a:buClr>
-                <a:srgbClr val="90C226"/>
-              </a:buClr>
-              <a:buSzPct val="80000"/>
-              <a:buFont typeface="Wingdings 3" charset="2"/>
-              <a:buChar char=""/>
-            </a:pPr>
-            <a:r>
-              <a:rPr lang="en-US" sz="1600" b="0" strike="noStrike" spc="-1">
-                <a:solidFill>
-                  <a:srgbClr val="404040"/>
-                </a:solidFill>
-                <a:uFill>
-                  <a:solidFill>
-                    <a:srgbClr val="FFFFFF"/>
-                  </a:solidFill>
-                </a:uFill>
-                <a:latin typeface="Trebuchet MS"/>
-              </a:rPr>
-              <a:t>Purpose &amp; Goals</a:t>
+              <a:t>Expo Pitch</a:t>
             </a:r>
           </a:p>
           <a:p>
@@ -8014,230 +7517,17 @@
               <a:buFont typeface="Wingdings 3" charset="2"/>
               <a:buChar char=""/>
             </a:pPr>
-            <a:r>
-              <a:rPr lang="en-US" sz="1800" b="0" strike="noStrike" spc="-1">
-                <a:solidFill>
-                  <a:srgbClr val="404040"/>
-                </a:solidFill>
-                <a:uFill>
-                  <a:solidFill>
-                    <a:srgbClr val="FFFFFF"/>
-                  </a:solidFill>
-                </a:uFill>
-                <a:latin typeface="Trebuchet MS"/>
-              </a:rPr>
-              <a:t>Current State</a:t>
-            </a:r>
-          </a:p>
-          <a:p>
-            <a:pPr marL="743040" lvl="1" indent="-285480">
-              <a:lnSpc>
-                <a:spcPct val="120000"/>
-              </a:lnSpc>
-              <a:spcBef>
-                <a:spcPts val="1001"/>
-              </a:spcBef>
-              <a:buClr>
-                <a:srgbClr val="90C226"/>
-              </a:buClr>
-              <a:buSzPct val="80000"/>
-              <a:buFont typeface="Wingdings 3" charset="2"/>
-              <a:buChar char=""/>
-            </a:pPr>
-            <a:r>
-              <a:rPr lang="en-US" sz="1600" b="0" strike="noStrike" spc="-1">
-                <a:solidFill>
-                  <a:srgbClr val="404040"/>
-                </a:solidFill>
-                <a:uFill>
-                  <a:solidFill>
-                    <a:srgbClr val="FFFFFF"/>
-                  </a:solidFill>
-                </a:uFill>
-                <a:latin typeface="Trebuchet MS"/>
-              </a:rPr>
-              <a:t>Alpha Status</a:t>
-            </a:r>
-          </a:p>
-          <a:p>
-            <a:pPr marL="1143000" lvl="2" indent="-228240">
-              <a:lnSpc>
-                <a:spcPct val="120000"/>
-              </a:lnSpc>
-              <a:spcBef>
-                <a:spcPts val="1001"/>
-              </a:spcBef>
-              <a:buClr>
-                <a:srgbClr val="90C226"/>
-              </a:buClr>
-              <a:buSzPct val="80000"/>
-              <a:buFont typeface="Wingdings 3" charset="2"/>
-              <a:buChar char=""/>
-            </a:pPr>
-            <a:r>
-              <a:rPr lang="en-US" sz="1400" b="0" strike="noStrike" spc="-1">
-                <a:solidFill>
-                  <a:srgbClr val="404040"/>
-                </a:solidFill>
-                <a:uFill>
-                  <a:solidFill>
-                    <a:srgbClr val="FFFFFF"/>
-                  </a:solidFill>
-                </a:uFill>
-                <a:latin typeface="Trebuchet MS"/>
-              </a:rPr>
-              <a:t>Respect to defined Iterations</a:t>
-            </a:r>
-          </a:p>
-          <a:p>
-            <a:pPr marL="743040" lvl="1" indent="-285480">
-              <a:lnSpc>
-                <a:spcPct val="120000"/>
-              </a:lnSpc>
-              <a:spcBef>
-                <a:spcPts val="1001"/>
-              </a:spcBef>
-              <a:buClr>
-                <a:srgbClr val="90C226"/>
-              </a:buClr>
-              <a:buSzPct val="80000"/>
-              <a:buFont typeface="Wingdings 3" charset="2"/>
-              <a:buChar char=""/>
-            </a:pPr>
-            <a:r>
-              <a:rPr lang="en-US" sz="1600" b="0" strike="noStrike" spc="-1">
-                <a:solidFill>
-                  <a:srgbClr val="404040"/>
-                </a:solidFill>
-                <a:uFill>
-                  <a:solidFill>
-                    <a:srgbClr val="FFFFFF"/>
-                  </a:solidFill>
-                </a:uFill>
-                <a:latin typeface="Trebuchet MS"/>
-              </a:rPr>
-              <a:t>System Demo</a:t>
-            </a:r>
-          </a:p>
-          <a:p>
-            <a:pPr marL="1143000" lvl="2" indent="-228240">
-              <a:lnSpc>
-                <a:spcPct val="120000"/>
-              </a:lnSpc>
-              <a:spcBef>
-                <a:spcPts val="1001"/>
-              </a:spcBef>
-              <a:buClr>
-                <a:srgbClr val="90C226"/>
-              </a:buClr>
-              <a:buSzPct val="80000"/>
-              <a:buFont typeface="Wingdings 3" charset="2"/>
-              <a:buChar char=""/>
-            </a:pPr>
-            <a:r>
-              <a:rPr lang="en-US" sz="1400" b="0" strike="noStrike" spc="-1">
-                <a:solidFill>
-                  <a:srgbClr val="404040"/>
-                </a:solidFill>
-                <a:uFill>
-                  <a:solidFill>
-                    <a:srgbClr val="FFFFFF"/>
-                  </a:solidFill>
-                </a:uFill>
-                <a:latin typeface="Trebuchet MS"/>
-              </a:rPr>
-              <a:t>Hardware Setup</a:t>
-            </a:r>
-          </a:p>
-          <a:p>
-            <a:pPr marL="1143000" lvl="2" indent="-228240">
-              <a:lnSpc>
-                <a:spcPct val="120000"/>
-              </a:lnSpc>
-              <a:spcBef>
-                <a:spcPts val="1001"/>
-              </a:spcBef>
-              <a:buClr>
-                <a:srgbClr val="90C226"/>
-              </a:buClr>
-              <a:buSzPct val="80000"/>
-              <a:buFont typeface="Wingdings 3" charset="2"/>
-              <a:buChar char=""/>
-            </a:pPr>
-            <a:r>
-              <a:rPr lang="en-US" sz="1400" b="0" strike="noStrike" spc="-1">
-                <a:solidFill>
-                  <a:srgbClr val="404040"/>
-                </a:solidFill>
-                <a:uFill>
-                  <a:solidFill>
-                    <a:srgbClr val="FFFFFF"/>
-                  </a:solidFill>
-                </a:uFill>
-                <a:latin typeface="Trebuchet MS"/>
-              </a:rPr>
-              <a:t>Initialization of System</a:t>
-            </a:r>
-          </a:p>
-          <a:p>
-            <a:pPr marL="1143000" lvl="2" indent="-228240">
-              <a:lnSpc>
-                <a:spcPct val="120000"/>
-              </a:lnSpc>
-              <a:spcBef>
-                <a:spcPts val="1001"/>
-              </a:spcBef>
-              <a:buClr>
-                <a:srgbClr val="90C226"/>
-              </a:buClr>
-              <a:buSzPct val="80000"/>
-              <a:buFont typeface="Wingdings 3" charset="2"/>
-              <a:buChar char=""/>
-            </a:pPr>
-            <a:r>
-              <a:rPr lang="en-US" sz="1400" b="0" strike="noStrike" spc="-1">
-                <a:solidFill>
-                  <a:srgbClr val="404040"/>
-                </a:solidFill>
-                <a:uFill>
-                  <a:solidFill>
-                    <a:srgbClr val="FFFFFF"/>
-                  </a:solidFill>
-                </a:uFill>
-                <a:latin typeface="Trebuchet MS"/>
-              </a:rPr>
-              <a:t>Advance Setup of System</a:t>
-            </a:r>
-          </a:p>
-          <a:p>
-            <a:pPr marL="743040" lvl="1" indent="-285480">
-              <a:lnSpc>
-                <a:spcPct val="120000"/>
-              </a:lnSpc>
-              <a:spcBef>
-                <a:spcPts val="1001"/>
-              </a:spcBef>
-              <a:buClr>
-                <a:srgbClr val="90C226"/>
-              </a:buClr>
-              <a:buSzPct val="80000"/>
-              <a:buFont typeface="Wingdings 3" charset="2"/>
-              <a:buChar char=""/>
-            </a:pPr>
-            <a:r>
-              <a:rPr lang="en-US" sz="1600" b="0" strike="noStrike" spc="-1">
-                <a:solidFill>
-                  <a:srgbClr val="404040"/>
-                </a:solidFill>
-                <a:uFill>
-                  <a:solidFill>
-                    <a:srgbClr val="FFFFFF"/>
-                  </a:solidFill>
-                </a:uFill>
-                <a:latin typeface="Trebuchet MS"/>
-              </a:rPr>
-              <a:t>A Look at the Subsystems</a:t>
-            </a:r>
+            <a:endParaRPr lang="en-US" sz="1800" b="0" strike="noStrike" spc="-1" dirty="0">
+              <a:solidFill>
+                <a:srgbClr val="404040"/>
+              </a:solidFill>
+              <a:uFill>
+                <a:solidFill>
+                  <a:srgbClr val="FFFFFF"/>
+                </a:solidFill>
+              </a:uFill>
+              <a:latin typeface="Trebuchet MS"/>
+            </a:endParaRPr>
           </a:p>
           <a:p>
             <a:pPr marL="343080" indent="-342720">
@@ -8255,7 +7545,7 @@
               <a:buChar char=""/>
             </a:pPr>
             <a:r>
-              <a:rPr lang="en-US" sz="1800" b="0" strike="noStrike" spc="-1">
+              <a:rPr lang="en-US" spc="-1" dirty="0">
                 <a:solidFill>
                   <a:srgbClr val="404040"/>
                 </a:solidFill>
@@ -8266,8 +7556,33 @@
                 </a:uFill>
                 <a:latin typeface="Trebuchet MS"/>
               </a:rPr>
-              <a:t>Struggles</a:t>
-            </a:r>
+              <a:t>Spotlight Features</a:t>
+            </a:r>
+          </a:p>
+          <a:p>
+            <a:pPr marL="360">
+              <a:lnSpc>
+                <a:spcPct val="120000"/>
+              </a:lnSpc>
+              <a:spcBef>
+                <a:spcPts val="1001"/>
+              </a:spcBef>
+              <a:buClr>
+                <a:srgbClr val="90C226"/>
+              </a:buClr>
+              <a:buSzPct val="80000"/>
+            </a:pPr>
+            <a:endParaRPr lang="en-US" spc="-1" dirty="0">
+              <a:solidFill>
+                <a:srgbClr val="404040"/>
+              </a:solidFill>
+              <a:uFill>
+                <a:solidFill>
+                  <a:srgbClr val="FFFFFF"/>
+                </a:solidFill>
+              </a:uFill>
+              <a:latin typeface="Trebuchet MS"/>
+            </a:endParaRPr>
           </a:p>
           <a:p>
             <a:pPr marL="343080" indent="-342720">
@@ -8285,7 +7600,7 @@
               <a:buChar char=""/>
             </a:pPr>
             <a:r>
-              <a:rPr lang="en-US" sz="1800" b="0" strike="noStrike" spc="-1">
+              <a:rPr lang="en-US" spc="-1">
                 <a:solidFill>
                   <a:srgbClr val="404040"/>
                 </a:solidFill>
@@ -8296,8 +7611,19 @@
                 </a:uFill>
                 <a:latin typeface="Trebuchet MS"/>
               </a:rPr>
-              <a:t>Moving Forward</a:t>
-            </a:r>
+              <a:t>Requirements Met</a:t>
+            </a:r>
+            <a:endParaRPr lang="en-US" sz="1800" b="0" strike="noStrike" spc="-1" dirty="0">
+              <a:solidFill>
+                <a:srgbClr val="404040"/>
+              </a:solidFill>
+              <a:uFill>
+                <a:solidFill>
+                  <a:srgbClr val="FFFFFF"/>
+                </a:solidFill>
+              </a:uFill>
+              <a:latin typeface="Trebuchet MS"/>
+            </a:endParaRPr>
           </a:p>
         </p:txBody>
       </p:sp>
@@ -8355,14 +7681,14 @@
       </p:grpSpPr>
       <p:sp>
         <p:nvSpPr>
-          <p:cNvPr id="122" name="TextShape 1"/>
+          <p:cNvPr id="136" name="TextShape 1"/>
           <p:cNvSpPr txBox="1"/>
           <p:nvPr/>
         </p:nvSpPr>
         <p:spPr>
           <a:xfrm>
-            <a:off x="677160" y="609480"/>
-            <a:ext cx="8596440" cy="705600"/>
+            <a:off x="677160" y="590760"/>
+            <a:ext cx="8596440" cy="1320480"/>
           </a:xfrm>
           <a:prstGeom prst="rect">
             <a:avLst/>
@@ -8382,7 +7708,7 @@
               </a:lnSpc>
             </a:pPr>
             <a:r>
-              <a:rPr lang="en-US" sz="3600" b="0" strike="noStrike" spc="-1">
+              <a:rPr lang="en-US" sz="3600" spc="-1" dirty="0">
                 <a:solidFill>
                   <a:srgbClr val="90C226"/>
                 </a:solidFill>
@@ -8393,9 +7719,9 @@
                 </a:uFill>
                 <a:latin typeface="Trebuchet MS"/>
               </a:rPr>
-              <a:t>Recap of PlanteR-GB</a:t>
-            </a:r>
-            <a:endParaRPr lang="en-US" sz="3600" b="0" strike="noStrike" spc="-1">
+              <a:t>Conclusion</a:t>
+            </a:r>
+            <a:endParaRPr lang="en-US" sz="3600" b="0" strike="noStrike" spc="-1" dirty="0">
               <a:solidFill>
                 <a:srgbClr val="000000"/>
               </a:solidFill>
@@ -8411,13 +7737,13 @@
       </p:sp>
       <p:sp>
         <p:nvSpPr>
-          <p:cNvPr id="123" name="TextShape 2"/>
+          <p:cNvPr id="137" name="TextShape 2"/>
           <p:cNvSpPr txBox="1"/>
           <p:nvPr/>
         </p:nvSpPr>
         <p:spPr>
           <a:xfrm>
-            <a:off x="677160" y="1595520"/>
+            <a:off x="677160" y="2160720"/>
             <a:ext cx="8596440" cy="3880440"/>
           </a:xfrm>
           <a:prstGeom prst="rect">
@@ -8447,7 +7773,7 @@
               <a:buChar char=""/>
             </a:pPr>
             <a:r>
-              <a:rPr lang="en-US" sz="1800" b="0" strike="noStrike" spc="-1">
+              <a:rPr lang="en-US" spc="-1" dirty="0">
                 <a:solidFill>
                   <a:srgbClr val="404040"/>
                 </a:solidFill>
@@ -8458,14 +7784,11 @@
                 </a:uFill>
                 <a:latin typeface="Trebuchet MS"/>
               </a:rPr>
-              <a:t>Oregon Winter Seasonal Weather</a:t>
-            </a:r>
-          </a:p>
-          <a:p>
-            <a:pPr marL="743040" lvl="1" indent="-285480">
-              <a:lnSpc>
-                <a:spcPct val="100000"/>
-              </a:lnSpc>
+              <a:t>Features we would like to add</a:t>
+            </a:r>
+          </a:p>
+          <a:p>
+            <a:pPr marL="800280" lvl="1" indent="-342720">
               <a:spcBef>
                 <a:spcPts val="1001"/>
               </a:spcBef>
@@ -8477,7 +7800,7 @@
               <a:buChar char=""/>
             </a:pPr>
             <a:r>
-              <a:rPr lang="en-US" sz="1600" b="0" strike="noStrike" spc="-1">
+              <a:rPr lang="en-US" spc="-1" dirty="0">
                 <a:solidFill>
                   <a:srgbClr val="404040"/>
                 </a:solidFill>
@@ -8488,14 +7811,11 @@
                 </a:uFill>
                 <a:latin typeface="Trebuchet MS"/>
               </a:rPr>
-              <a:t>Not great…</a:t>
-            </a:r>
-          </a:p>
-          <a:p>
-            <a:pPr marL="343080" indent="-342720">
-              <a:lnSpc>
-                <a:spcPct val="100000"/>
-              </a:lnSpc>
+              <a:t>Mobile site improvements</a:t>
+            </a:r>
+          </a:p>
+          <a:p>
+            <a:pPr marL="800280" lvl="1" indent="-342720">
               <a:spcBef>
                 <a:spcPts val="1001"/>
               </a:spcBef>
@@ -8507,7 +7827,7 @@
               <a:buChar char=""/>
             </a:pPr>
             <a:r>
-              <a:rPr lang="en-US" sz="1800" b="0" strike="noStrike" spc="-1">
+              <a:rPr lang="en-US" spc="-1" dirty="0">
                 <a:solidFill>
                   <a:srgbClr val="404040"/>
                 </a:solidFill>
@@ -8518,14 +7838,11 @@
                 </a:uFill>
                 <a:latin typeface="Trebuchet MS"/>
               </a:rPr>
-              <a:t>Growing Indoors</a:t>
-            </a:r>
-          </a:p>
-          <a:p>
-            <a:pPr marL="743040" lvl="1" indent="-285480">
-              <a:lnSpc>
-                <a:spcPct val="100000"/>
-              </a:lnSpc>
+              <a:t>Pre-build profile settings </a:t>
+            </a:r>
+          </a:p>
+          <a:p>
+            <a:pPr marL="800280" lvl="1" indent="-342720">
               <a:spcBef>
                 <a:spcPts val="1001"/>
               </a:spcBef>
@@ -8537,7 +7854,7 @@
               <a:buChar char=""/>
             </a:pPr>
             <a:r>
-              <a:rPr lang="en-US" sz="1600" b="0" strike="noStrike" spc="-1">
+              <a:rPr lang="en-US" spc="-1" dirty="0">
                 <a:solidFill>
                   <a:srgbClr val="404040"/>
                 </a:solidFill>
@@ -8548,14 +7865,11 @@
                 </a:uFill>
                 <a:latin typeface="Trebuchet MS"/>
               </a:rPr>
-              <a:t>Expensive</a:t>
-            </a:r>
-          </a:p>
-          <a:p>
-            <a:pPr marL="743040" lvl="1" indent="-285480">
-              <a:lnSpc>
-                <a:spcPct val="100000"/>
-              </a:lnSpc>
+              <a:t>3D printed planter box</a:t>
+            </a:r>
+          </a:p>
+          <a:p>
+            <a:pPr marL="800280" lvl="1" indent="-342720">
               <a:spcBef>
                 <a:spcPts val="1001"/>
               </a:spcBef>
@@ -8567,7 +7881,7 @@
               <a:buChar char=""/>
             </a:pPr>
             <a:r>
-              <a:rPr lang="en-US" sz="1600" b="0" strike="noStrike" spc="-1">
+              <a:rPr lang="en-US" b="0" strike="noStrike" spc="-1" dirty="0">
                 <a:solidFill>
                   <a:srgbClr val="404040"/>
                 </a:solidFill>
@@ -8578,14 +7892,11 @@
                 </a:uFill>
                 <a:latin typeface="Trebuchet MS"/>
               </a:rPr>
-              <a:t>Limited System Options</a:t>
-            </a:r>
-          </a:p>
-          <a:p>
-            <a:pPr marL="743040" lvl="1" indent="-285480">
-              <a:lnSpc>
-                <a:spcPct val="100000"/>
-              </a:lnSpc>
+              <a:t>Moisture and Temperature sensors.</a:t>
+            </a:r>
+          </a:p>
+          <a:p>
+            <a:pPr marL="800280" lvl="1" indent="-342720">
               <a:spcBef>
                 <a:spcPts val="1001"/>
               </a:spcBef>
@@ -8596,151 +7907,7 @@
               <a:buFont typeface="Wingdings 3" charset="2"/>
               <a:buChar char=""/>
             </a:pPr>
-            <a:r>
-              <a:rPr lang="en-US" sz="1600" b="0" strike="noStrike" spc="-1">
-                <a:solidFill>
-                  <a:srgbClr val="404040"/>
-                </a:solidFill>
-                <a:uFill>
-                  <a:solidFill>
-                    <a:srgbClr val="FFFFFF"/>
-                  </a:solidFill>
-                </a:uFill>
-                <a:latin typeface="Trebuchet MS"/>
-              </a:rPr>
-              <a:t>Human Schedules</a:t>
-            </a:r>
-          </a:p>
-          <a:p>
-            <a:pPr marL="343080" indent="-342720">
-              <a:lnSpc>
-                <a:spcPct val="100000"/>
-              </a:lnSpc>
-              <a:spcBef>
-                <a:spcPts val="1001"/>
-              </a:spcBef>
-              <a:buClr>
-                <a:srgbClr val="90C226"/>
-              </a:buClr>
-              <a:buSzPct val="80000"/>
-              <a:buFont typeface="Wingdings 3" charset="2"/>
-              <a:buChar char=""/>
-            </a:pPr>
-            <a:r>
-              <a:rPr lang="en-US" sz="1800" b="0" strike="noStrike" spc="-1">
-                <a:solidFill>
-                  <a:srgbClr val="404040"/>
-                </a:solidFill>
-                <a:uFill>
-                  <a:solidFill>
-                    <a:srgbClr val="FFFFFF"/>
-                  </a:solidFill>
-                </a:uFill>
-                <a:latin typeface="Trebuchet MS"/>
-              </a:rPr>
-              <a:t>Solution:</a:t>
-            </a:r>
-          </a:p>
-          <a:p>
-            <a:pPr marL="743040" lvl="1" indent="-285480">
-              <a:lnSpc>
-                <a:spcPct val="100000"/>
-              </a:lnSpc>
-              <a:spcBef>
-                <a:spcPts val="1001"/>
-              </a:spcBef>
-              <a:buClr>
-                <a:srgbClr val="90C226"/>
-              </a:buClr>
-              <a:buSzPct val="80000"/>
-              <a:buFont typeface="Wingdings 3" charset="2"/>
-              <a:buChar char=""/>
-            </a:pPr>
-            <a:r>
-              <a:rPr lang="en-US" sz="1600" b="0" strike="noStrike" spc="-1">
-                <a:solidFill>
-                  <a:srgbClr val="404040"/>
-                </a:solidFill>
-                <a:uFill>
-                  <a:solidFill>
-                    <a:srgbClr val="FFFFFF"/>
-                  </a:solidFill>
-                </a:uFill>
-                <a:latin typeface="Trebuchet MS"/>
-              </a:rPr>
-              <a:t>RGB LEDs</a:t>
-            </a:r>
-          </a:p>
-          <a:p>
-            <a:pPr marL="743040" lvl="1" indent="-285480">
-              <a:lnSpc>
-                <a:spcPct val="100000"/>
-              </a:lnSpc>
-              <a:spcBef>
-                <a:spcPts val="1001"/>
-              </a:spcBef>
-              <a:buClr>
-                <a:srgbClr val="90C226"/>
-              </a:buClr>
-              <a:buSzPct val="80000"/>
-              <a:buFont typeface="Wingdings 3" charset="2"/>
-              <a:buChar char=""/>
-            </a:pPr>
-            <a:r>
-              <a:rPr lang="en-US" sz="1600" b="0" strike="noStrike" spc="-1">
-                <a:solidFill>
-                  <a:srgbClr val="404040"/>
-                </a:solidFill>
-                <a:uFill>
-                  <a:solidFill>
-                    <a:srgbClr val="FFFFFF"/>
-                  </a:solidFill>
-                </a:uFill>
-                <a:latin typeface="Trebuchet MS"/>
-              </a:rPr>
-              <a:t>Scheduling</a:t>
-            </a:r>
-          </a:p>
-          <a:p>
-            <a:pPr marL="743040" lvl="1" indent="-285480">
-              <a:lnSpc>
-                <a:spcPct val="100000"/>
-              </a:lnSpc>
-              <a:spcBef>
-                <a:spcPts val="1001"/>
-              </a:spcBef>
-              <a:buClr>
-                <a:srgbClr val="90C226"/>
-              </a:buClr>
-              <a:buSzPct val="80000"/>
-              <a:buFont typeface="Wingdings 3" charset="2"/>
-              <a:buChar char=""/>
-            </a:pPr>
-            <a:r>
-              <a:rPr lang="en-US" sz="1600" b="0" strike="noStrike" spc="-1">
-                <a:solidFill>
-                  <a:srgbClr val="404040"/>
-                </a:solidFill>
-                <a:uFill>
-                  <a:solidFill>
-                    <a:srgbClr val="FFFFFF"/>
-                  </a:solidFill>
-                </a:uFill>
-                <a:latin typeface="Trebuchet MS"/>
-              </a:rPr>
-              <a:t>Multiple controllers = Redundancy</a:t>
-            </a:r>
-          </a:p>
-          <a:p>
-            <a:pPr>
-              <a:lnSpc>
-                <a:spcPct val="100000"/>
-              </a:lnSpc>
-              <a:spcBef>
-                <a:spcPts val="1001"/>
-              </a:spcBef>
-            </a:pPr>
-            <a:endParaRPr lang="en-US" sz="1600" b="0" strike="noStrike" spc="-1">
+            <a:endParaRPr lang="en-US" b="0" strike="noStrike" spc="-1" dirty="0">
               <a:solidFill>
                 <a:srgbClr val="404040"/>
               </a:solidFill>
@@ -8751,2322 +7918,6 @@
               </a:uFill>
               <a:latin typeface="Trebuchet MS"/>
             </a:endParaRPr>
-          </a:p>
-        </p:txBody>
-      </p:sp>
-    </p:spTree>
-  </p:cSld>
-  <p:clrMapOvr>
-    <a:masterClrMapping/>
-  </p:clrMapOvr>
-  <p:timing>
-    <p:tnLst>
-      <p:par>
-        <p:cTn id="1" dur="indefinite" restart="never" nodeType="tmRoot">
-          <p:childTnLst>
-            <p:seq>
-              <p:cTn id="2" nodeType="mainSeq"/>
-              <p:prevCondLst>
-                <p:cond evt="onPrev" delay="0">
-                  <p:tgtEl>
-                    <p:sldTgt/>
-                  </p:tgtEl>
-                </p:cond>
-              </p:prevCondLst>
-              <p:nextCondLst>
-                <p:cond evt="onNext" delay="0">
-                  <p:tgtEl>
-                    <p:sldTgt/>
-                  </p:tgtEl>
-                </p:cond>
-              </p:nextCondLst>
-            </p:seq>
-          </p:childTnLst>
-        </p:cTn>
-      </p:par>
-    </p:tnLst>
-  </p:timing>
-</p:sld>
-</file>
-
-<file path=ppt/slides/slide4.xml><?xml version="1.0" encoding="utf-8"?>
-<p:sld xmlns:a="http://schemas.openxmlformats.org/drawingml/2006/main" xmlns:r="http://schemas.openxmlformats.org/officeDocument/2006/relationships" xmlns:p="http://schemas.openxmlformats.org/presentationml/2006/main">
-  <p:cSld>
-    <p:spTree>
-      <p:nvGrpSpPr>
-        <p:cNvPr id="1" name=""/>
-        <p:cNvGrpSpPr/>
-        <p:nvPr/>
-      </p:nvGrpSpPr>
-      <p:grpSpPr>
-        <a:xfrm>
-          <a:off x="0" y="0"/>
-          <a:ext cx="0" cy="0"/>
-          <a:chOff x="0" y="0"/>
-          <a:chExt cx="0" cy="0"/>
-        </a:xfrm>
-      </p:grpSpPr>
-      <p:sp>
-        <p:nvSpPr>
-          <p:cNvPr id="124" name="TextShape 1"/>
-          <p:cNvSpPr txBox="1"/>
-          <p:nvPr/>
-        </p:nvSpPr>
-        <p:spPr>
-          <a:xfrm>
-            <a:off x="677160" y="609480"/>
-            <a:ext cx="8596440" cy="771120"/>
-          </a:xfrm>
-          <a:prstGeom prst="rect">
-            <a:avLst/>
-          </a:prstGeom>
-          <a:noFill/>
-          <a:ln>
-            <a:noFill/>
-          </a:ln>
-        </p:spPr>
-        <p:txBody>
-          <a:bodyPr/>
-          <a:lstStyle/>
-          <a:p>
-            <a:pPr>
-              <a:lnSpc>
-                <a:spcPct val="100000"/>
-              </a:lnSpc>
-            </a:pPr>
-            <a:r>
-              <a:rPr lang="en-US" sz="3600" b="0" strike="noStrike" spc="-1">
-                <a:solidFill>
-                  <a:srgbClr val="90C226"/>
-                </a:solidFill>
-                <a:uFill>
-                  <a:solidFill>
-                    <a:srgbClr val="FFFFFF"/>
-                  </a:solidFill>
-                </a:uFill>
-                <a:latin typeface="Trebuchet MS"/>
-              </a:rPr>
-              <a:t>PlanteR-GB Current Status</a:t>
-            </a:r>
-            <a:endParaRPr lang="en-US" sz="3600" b="0" strike="noStrike" spc="-1">
-              <a:solidFill>
-                <a:srgbClr val="000000"/>
-              </a:solidFill>
-              <a:uFill>
-                <a:solidFill>
-                  <a:srgbClr val="FFFFFF"/>
-                </a:solidFill>
-              </a:uFill>
-              <a:latin typeface="Trebuchet MS"/>
-            </a:endParaRPr>
-          </a:p>
-        </p:txBody>
-      </p:sp>
-      <p:sp>
-        <p:nvSpPr>
-          <p:cNvPr id="125" name="TextShape 2"/>
-          <p:cNvSpPr txBox="1"/>
-          <p:nvPr/>
-        </p:nvSpPr>
-        <p:spPr>
-          <a:xfrm>
-            <a:off x="677160" y="1380960"/>
-            <a:ext cx="8596440" cy="3880440"/>
-          </a:xfrm>
-          <a:prstGeom prst="rect">
-            <a:avLst/>
-          </a:prstGeom>
-          <a:noFill/>
-          <a:ln>
-            <a:noFill/>
-          </a:ln>
-        </p:spPr>
-        <p:txBody>
-          <a:bodyPr>
-            <a:normAutofit/>
-          </a:bodyPr>
-          <a:lstStyle/>
-          <a:p>
-            <a:pPr marL="343080" indent="-342720">
-              <a:lnSpc>
-                <a:spcPct val="100000"/>
-              </a:lnSpc>
-              <a:spcBef>
-                <a:spcPts val="1001"/>
-              </a:spcBef>
-              <a:buClr>
-                <a:srgbClr val="90C226"/>
-              </a:buClr>
-              <a:buSzPct val="80000"/>
-              <a:buFont typeface="Wingdings 3" charset="2"/>
-              <a:buChar char=""/>
-            </a:pPr>
-            <a:r>
-              <a:rPr lang="en-US" sz="1800" b="0" strike="noStrike" spc="-1">
-                <a:solidFill>
-                  <a:srgbClr val="404040"/>
-                </a:solidFill>
-                <a:uFill>
-                  <a:solidFill>
-                    <a:srgbClr val="FFFFFF"/>
-                  </a:solidFill>
-                </a:uFill>
-                <a:latin typeface="Trebuchet MS"/>
-              </a:rPr>
-              <a:t>Alpha </a:t>
-            </a:r>
-          </a:p>
-          <a:p>
-            <a:pPr marL="743040" lvl="1" indent="-285480">
-              <a:lnSpc>
-                <a:spcPct val="100000"/>
-              </a:lnSpc>
-              <a:spcBef>
-                <a:spcPts val="1001"/>
-              </a:spcBef>
-              <a:buClr>
-                <a:srgbClr val="90C226"/>
-              </a:buClr>
-              <a:buSzPct val="80000"/>
-              <a:buFont typeface="Wingdings 3" charset="2"/>
-              <a:buChar char=""/>
-            </a:pPr>
-            <a:r>
-              <a:rPr lang="en-US" sz="1600" b="0" strike="noStrike" spc="-1">
-                <a:solidFill>
-                  <a:srgbClr val="404040"/>
-                </a:solidFill>
-                <a:uFill>
-                  <a:solidFill>
-                    <a:srgbClr val="FFFFFF"/>
-                  </a:solidFill>
-                </a:uFill>
-                <a:latin typeface="Trebuchet MS"/>
-              </a:rPr>
-              <a:t>All subsystems contain core functionality</a:t>
-            </a:r>
-          </a:p>
-          <a:p>
-            <a:pPr marL="1143000" lvl="2" indent="-228240">
-              <a:lnSpc>
-                <a:spcPct val="100000"/>
-              </a:lnSpc>
-              <a:spcBef>
-                <a:spcPts val="1001"/>
-              </a:spcBef>
-              <a:buClr>
-                <a:srgbClr val="90C226"/>
-              </a:buClr>
-              <a:buSzPct val="80000"/>
-              <a:buFont typeface="Wingdings 3" charset="2"/>
-              <a:buChar char=""/>
-            </a:pPr>
-            <a:r>
-              <a:rPr lang="en-US" sz="1400" b="0" strike="noStrike" spc="-1">
-                <a:solidFill>
-                  <a:srgbClr val="404040"/>
-                </a:solidFill>
-                <a:uFill>
-                  <a:solidFill>
-                    <a:srgbClr val="FFFFFF"/>
-                  </a:solidFill>
-                </a:uFill>
-                <a:latin typeface="Trebuchet MS"/>
-              </a:rPr>
-              <a:t>Many improvements or additions for more functionality</a:t>
-            </a:r>
-          </a:p>
-          <a:p>
-            <a:pPr marL="743040" lvl="1" indent="-285480">
-              <a:lnSpc>
-                <a:spcPct val="100000"/>
-              </a:lnSpc>
-              <a:spcBef>
-                <a:spcPts val="1001"/>
-              </a:spcBef>
-              <a:buClr>
-                <a:srgbClr val="90C226"/>
-              </a:buClr>
-              <a:buSzPct val="80000"/>
-              <a:buFont typeface="Wingdings 3" charset="2"/>
-              <a:buChar char=""/>
-            </a:pPr>
-            <a:r>
-              <a:rPr lang="en-US" sz="1600" b="0" strike="noStrike" spc="-1">
-                <a:solidFill>
-                  <a:srgbClr val="404040"/>
-                </a:solidFill>
-                <a:uFill>
-                  <a:solidFill>
-                    <a:srgbClr val="FFFFFF"/>
-                  </a:solidFill>
-                </a:uFill>
-                <a:latin typeface="Trebuchet MS"/>
-              </a:rPr>
-              <a:t>Data flow from user to hardware</a:t>
-            </a:r>
-          </a:p>
-          <a:p>
-            <a:pPr marL="743040" lvl="1" indent="-285480">
-              <a:lnSpc>
-                <a:spcPct val="100000"/>
-              </a:lnSpc>
-              <a:spcBef>
-                <a:spcPts val="1001"/>
-              </a:spcBef>
-              <a:buClr>
-                <a:srgbClr val="90C226"/>
-              </a:buClr>
-              <a:buSzPct val="80000"/>
-              <a:buFont typeface="Wingdings 3" charset="2"/>
-              <a:buChar char=""/>
-            </a:pPr>
-            <a:r>
-              <a:rPr lang="en-US" sz="1600" b="0" strike="noStrike" spc="-1">
-                <a:solidFill>
-                  <a:srgbClr val="404040"/>
-                </a:solidFill>
-                <a:uFill>
-                  <a:solidFill>
-                    <a:srgbClr val="FFFFFF"/>
-                  </a:solidFill>
-                </a:uFill>
-                <a:latin typeface="Trebuchet MS"/>
-              </a:rPr>
-              <a:t>Respect to Projected Iterations</a:t>
-            </a:r>
-            <a:br/>
-            <a:r>
-              <a:rPr lang="en-US" sz="1600" b="0" strike="noStrike" spc="-1">
-                <a:solidFill>
-                  <a:srgbClr val="404040"/>
-                </a:solidFill>
-                <a:uFill>
-                  <a:solidFill>
-                    <a:srgbClr val="FFFFFF"/>
-                  </a:solidFill>
-                </a:uFill>
-                <a:latin typeface="Trebuchet MS"/>
-              </a:rPr>
-              <a:t> </a:t>
-            </a:r>
-          </a:p>
-          <a:p>
-            <a:pPr marL="343080" indent="-342720">
-              <a:lnSpc>
-                <a:spcPct val="100000"/>
-              </a:lnSpc>
-              <a:spcBef>
-                <a:spcPts val="1001"/>
-              </a:spcBef>
-              <a:buClr>
-                <a:srgbClr val="90C226"/>
-              </a:buClr>
-              <a:buSzPct val="80000"/>
-              <a:buFont typeface="Wingdings 3" charset="2"/>
-              <a:buChar char=""/>
-            </a:pPr>
-            <a:r>
-              <a:rPr lang="en-US" sz="1800" b="0" strike="noStrike" spc="-1">
-                <a:solidFill>
-                  <a:srgbClr val="404040"/>
-                </a:solidFill>
-                <a:uFill>
-                  <a:solidFill>
-                    <a:srgbClr val="FFFFFF"/>
-                  </a:solidFill>
-                </a:uFill>
-                <a:latin typeface="Trebuchet MS"/>
-              </a:rPr>
-              <a:t>System Demo</a:t>
-            </a:r>
-          </a:p>
-          <a:p>
-            <a:pPr>
-              <a:lnSpc>
-                <a:spcPct val="100000"/>
-              </a:lnSpc>
-              <a:spcBef>
-                <a:spcPts val="1001"/>
-              </a:spcBef>
-            </a:pPr>
-            <a:endParaRPr lang="en-US" sz="1800" b="0" strike="noStrike" spc="-1">
-              <a:solidFill>
-                <a:srgbClr val="404040"/>
-              </a:solidFill>
-              <a:uFill>
-                <a:solidFill>
-                  <a:srgbClr val="FFFFFF"/>
-                </a:solidFill>
-              </a:uFill>
-              <a:latin typeface="Trebuchet MS"/>
-            </a:endParaRPr>
-          </a:p>
-        </p:txBody>
-      </p:sp>
-    </p:spTree>
-  </p:cSld>
-  <p:clrMapOvr>
-    <a:masterClrMapping/>
-  </p:clrMapOvr>
-  <p:timing>
-    <p:tnLst>
-      <p:par>
-        <p:cTn id="1" dur="indefinite" restart="never" nodeType="tmRoot">
-          <p:childTnLst>
-            <p:seq>
-              <p:cTn id="2" nodeType="mainSeq"/>
-              <p:prevCondLst>
-                <p:cond evt="onPrev" delay="0">
-                  <p:tgtEl>
-                    <p:sldTgt/>
-                  </p:tgtEl>
-                </p:cond>
-              </p:prevCondLst>
-              <p:nextCondLst>
-                <p:cond evt="onNext" delay="0">
-                  <p:tgtEl>
-                    <p:sldTgt/>
-                  </p:tgtEl>
-                </p:cond>
-              </p:nextCondLst>
-            </p:seq>
-          </p:childTnLst>
-        </p:cTn>
-      </p:par>
-    </p:tnLst>
-  </p:timing>
-</p:sld>
-</file>
-
-<file path=ppt/slides/slide5.xml><?xml version="1.0" encoding="utf-8"?>
-<p:sld xmlns:a="http://schemas.openxmlformats.org/drawingml/2006/main" xmlns:r="http://schemas.openxmlformats.org/officeDocument/2006/relationships" xmlns:p="http://schemas.openxmlformats.org/presentationml/2006/main">
-  <p:cSld>
-    <p:spTree>
-      <p:nvGrpSpPr>
-        <p:cNvPr id="1" name=""/>
-        <p:cNvGrpSpPr/>
-        <p:nvPr/>
-      </p:nvGrpSpPr>
-      <p:grpSpPr>
-        <a:xfrm>
-          <a:off x="0" y="0"/>
-          <a:ext cx="0" cy="0"/>
-          <a:chOff x="0" y="0"/>
-          <a:chExt cx="0" cy="0"/>
-        </a:xfrm>
-      </p:grpSpPr>
-      <p:sp>
-        <p:nvSpPr>
-          <p:cNvPr id="126" name="TextShape 1"/>
-          <p:cNvSpPr txBox="1"/>
-          <p:nvPr/>
-        </p:nvSpPr>
-        <p:spPr>
-          <a:xfrm>
-            <a:off x="677160" y="609480"/>
-            <a:ext cx="8596440" cy="743040"/>
-          </a:xfrm>
-          <a:prstGeom prst="rect">
-            <a:avLst/>
-          </a:prstGeom>
-          <a:noFill/>
-          <a:ln>
-            <a:noFill/>
-          </a:ln>
-        </p:spPr>
-        <p:txBody>
-          <a:bodyPr/>
-          <a:lstStyle/>
-          <a:p>
-            <a:pPr>
-              <a:lnSpc>
-                <a:spcPct val="100000"/>
-              </a:lnSpc>
-            </a:pPr>
-            <a:r>
-              <a:rPr lang="en-US" sz="3600" b="0" strike="noStrike" spc="-1">
-                <a:solidFill>
-                  <a:srgbClr val="90C226"/>
-                </a:solidFill>
-                <a:uFill>
-                  <a:solidFill>
-                    <a:srgbClr val="FFFFFF"/>
-                  </a:solidFill>
-                </a:uFill>
-                <a:latin typeface="Trebuchet MS"/>
-              </a:rPr>
-              <a:t>Subsystems – Cmd Line Interface</a:t>
-            </a:r>
-            <a:endParaRPr lang="en-US" sz="3600" b="0" strike="noStrike" spc="-1">
-              <a:solidFill>
-                <a:srgbClr val="000000"/>
-              </a:solidFill>
-              <a:uFill>
-                <a:solidFill>
-                  <a:srgbClr val="FFFFFF"/>
-                </a:solidFill>
-              </a:uFill>
-              <a:latin typeface="Trebuchet MS"/>
-            </a:endParaRPr>
-          </a:p>
-        </p:txBody>
-      </p:sp>
-      <p:sp>
-        <p:nvSpPr>
-          <p:cNvPr id="127" name="TextShape 2"/>
-          <p:cNvSpPr txBox="1"/>
-          <p:nvPr/>
-        </p:nvSpPr>
-        <p:spPr>
-          <a:xfrm>
-            <a:off x="677160" y="2160720"/>
-            <a:ext cx="8596440" cy="3880440"/>
-          </a:xfrm>
-          <a:prstGeom prst="rect">
-            <a:avLst/>
-          </a:prstGeom>
-          <a:noFill/>
-          <a:ln>
-            <a:noFill/>
-          </a:ln>
-        </p:spPr>
-        <p:txBody>
-          <a:bodyPr/>
-          <a:lstStyle/>
-          <a:p>
-            <a:pPr marL="343080" indent="-342720">
-              <a:lnSpc>
-                <a:spcPct val="100000"/>
-              </a:lnSpc>
-              <a:spcBef>
-                <a:spcPts val="1001"/>
-              </a:spcBef>
-              <a:buClr>
-                <a:srgbClr val="90C226"/>
-              </a:buClr>
-              <a:buSzPct val="80000"/>
-              <a:buFont typeface="Wingdings 3" charset="2"/>
-              <a:buChar char=""/>
-            </a:pPr>
-            <a:r>
-              <a:rPr lang="en-US" sz="1800" b="0" strike="noStrike" spc="-1">
-                <a:solidFill>
-                  <a:srgbClr val="404040"/>
-                </a:solidFill>
-                <a:uFill>
-                  <a:solidFill>
-                    <a:srgbClr val="FFFFFF"/>
-                  </a:solidFill>
-                </a:uFill>
-                <a:latin typeface="Trebuchet MS"/>
-              </a:rPr>
-              <a:t>Written in Python using Python Requests</a:t>
-            </a:r>
-          </a:p>
-          <a:p>
-            <a:pPr marL="343080" indent="-342720">
-              <a:lnSpc>
-                <a:spcPct val="100000"/>
-              </a:lnSpc>
-              <a:spcBef>
-                <a:spcPts val="1001"/>
-              </a:spcBef>
-              <a:buClr>
-                <a:srgbClr val="90C226"/>
-              </a:buClr>
-              <a:buSzPct val="80000"/>
-              <a:buFont typeface="Wingdings 3" charset="2"/>
-              <a:buChar char=""/>
-            </a:pPr>
-            <a:r>
-              <a:rPr lang="en-US" sz="1800" b="0" strike="noStrike" spc="-1">
-                <a:solidFill>
-                  <a:srgbClr val="404040"/>
-                </a:solidFill>
-                <a:uFill>
-                  <a:solidFill>
-                    <a:srgbClr val="FFFFFF"/>
-                  </a:solidFill>
-                </a:uFill>
-                <a:latin typeface="Trebuchet MS"/>
-              </a:rPr>
-              <a:t>Communicates with API Through HTTP Requests</a:t>
-            </a:r>
-          </a:p>
-          <a:p>
-            <a:pPr marL="343080" indent="-342720">
-              <a:lnSpc>
-                <a:spcPct val="100000"/>
-              </a:lnSpc>
-              <a:spcBef>
-                <a:spcPts val="1001"/>
-              </a:spcBef>
-              <a:buClr>
-                <a:srgbClr val="90C226"/>
-              </a:buClr>
-              <a:buSzPct val="80000"/>
-              <a:buFont typeface="Wingdings 3" charset="2"/>
-              <a:buChar char=""/>
-            </a:pPr>
-            <a:r>
-              <a:rPr lang="en-US" sz="1800" b="0" strike="noStrike" spc="-1">
-                <a:solidFill>
-                  <a:srgbClr val="404040"/>
-                </a:solidFill>
-                <a:uFill>
-                  <a:solidFill>
-                    <a:srgbClr val="FFFFFF"/>
-                  </a:solidFill>
-                </a:uFill>
-                <a:latin typeface="Trebuchet MS"/>
-              </a:rPr>
-              <a:t>8 Different Commands (Zone, Profile, Schedule, Demo1, Demo2, Apply Changes, Shut down)</a:t>
-            </a:r>
-          </a:p>
-          <a:p>
-            <a:pPr>
-              <a:lnSpc>
-                <a:spcPct val="100000"/>
-              </a:lnSpc>
-              <a:spcBef>
-                <a:spcPts val="1001"/>
-              </a:spcBef>
-            </a:pPr>
-            <a:endParaRPr lang="en-US" sz="1800" b="0" strike="noStrike" spc="-1">
-              <a:solidFill>
-                <a:srgbClr val="404040"/>
-              </a:solidFill>
-              <a:uFill>
-                <a:solidFill>
-                  <a:srgbClr val="FFFFFF"/>
-                </a:solidFill>
-              </a:uFill>
-              <a:latin typeface="Trebuchet MS"/>
-            </a:endParaRPr>
-          </a:p>
-        </p:txBody>
-      </p:sp>
-    </p:spTree>
-  </p:cSld>
-  <p:clrMapOvr>
-    <a:masterClrMapping/>
-  </p:clrMapOvr>
-  <p:timing>
-    <p:tnLst>
-      <p:par>
-        <p:cTn id="1" dur="indefinite" restart="never" nodeType="tmRoot">
-          <p:childTnLst>
-            <p:seq>
-              <p:cTn id="2" nodeType="mainSeq"/>
-              <p:prevCondLst>
-                <p:cond evt="onPrev" delay="0">
-                  <p:tgtEl>
-                    <p:sldTgt/>
-                  </p:tgtEl>
-                </p:cond>
-              </p:prevCondLst>
-              <p:nextCondLst>
-                <p:cond evt="onNext" delay="0">
-                  <p:tgtEl>
-                    <p:sldTgt/>
-                  </p:tgtEl>
-                </p:cond>
-              </p:nextCondLst>
-            </p:seq>
-          </p:childTnLst>
-        </p:cTn>
-      </p:par>
-    </p:tnLst>
-  </p:timing>
-</p:sld>
-</file>
-
-<file path=ppt/slides/slide6.xml><?xml version="1.0" encoding="utf-8"?>
-<p:sld xmlns:a="http://schemas.openxmlformats.org/drawingml/2006/main" xmlns:r="http://schemas.openxmlformats.org/officeDocument/2006/relationships" xmlns:p="http://schemas.openxmlformats.org/presentationml/2006/main">
-  <p:cSld>
-    <p:spTree>
-      <p:nvGrpSpPr>
-        <p:cNvPr id="1" name=""/>
-        <p:cNvGrpSpPr/>
-        <p:nvPr/>
-      </p:nvGrpSpPr>
-      <p:grpSpPr>
-        <a:xfrm>
-          <a:off x="0" y="0"/>
-          <a:ext cx="0" cy="0"/>
-          <a:chOff x="0" y="0"/>
-          <a:chExt cx="0" cy="0"/>
-        </a:xfrm>
-      </p:grpSpPr>
-      <p:sp>
-        <p:nvSpPr>
-          <p:cNvPr id="128" name="TextShape 1"/>
-          <p:cNvSpPr txBox="1"/>
-          <p:nvPr/>
-        </p:nvSpPr>
-        <p:spPr>
-          <a:xfrm>
-            <a:off x="677160" y="609480"/>
-            <a:ext cx="8596440" cy="743040"/>
-          </a:xfrm>
-          <a:prstGeom prst="rect">
-            <a:avLst/>
-          </a:prstGeom>
-          <a:noFill/>
-          <a:ln>
-            <a:noFill/>
-          </a:ln>
-        </p:spPr>
-        <p:txBody>
-          <a:bodyPr/>
-          <a:lstStyle/>
-          <a:p>
-            <a:pPr>
-              <a:lnSpc>
-                <a:spcPct val="100000"/>
-              </a:lnSpc>
-            </a:pPr>
-            <a:r>
-              <a:rPr lang="en-US" sz="3600" b="0" strike="noStrike" spc="-1">
-                <a:solidFill>
-                  <a:srgbClr val="90C226"/>
-                </a:solidFill>
-                <a:uFill>
-                  <a:solidFill>
-                    <a:srgbClr val="FFFFFF"/>
-                  </a:solidFill>
-                </a:uFill>
-                <a:latin typeface="Trebuchet MS"/>
-              </a:rPr>
-              <a:t>Subsystems – API and Internal State</a:t>
-            </a:r>
-            <a:endParaRPr lang="en-US" sz="3600" b="0" strike="noStrike" spc="-1">
-              <a:solidFill>
-                <a:srgbClr val="000000"/>
-              </a:solidFill>
-              <a:uFill>
-                <a:solidFill>
-                  <a:srgbClr val="FFFFFF"/>
-                </a:solidFill>
-              </a:uFill>
-              <a:latin typeface="Trebuchet MS"/>
-            </a:endParaRPr>
-          </a:p>
-        </p:txBody>
-      </p:sp>
-      <p:sp>
-        <p:nvSpPr>
-          <p:cNvPr id="129" name="TextShape 2"/>
-          <p:cNvSpPr txBox="1"/>
-          <p:nvPr/>
-        </p:nvSpPr>
-        <p:spPr>
-          <a:xfrm>
-            <a:off x="677160" y="1676520"/>
-            <a:ext cx="8596440" cy="4952520"/>
-          </a:xfrm>
-          <a:prstGeom prst="rect">
-            <a:avLst/>
-          </a:prstGeom>
-          <a:noFill/>
-          <a:ln>
-            <a:noFill/>
-          </a:ln>
-        </p:spPr>
-        <p:txBody>
-          <a:bodyPr>
-            <a:normAutofit/>
-          </a:bodyPr>
-          <a:lstStyle/>
-          <a:p>
-            <a:pPr marL="343080" indent="-342720">
-              <a:lnSpc>
-                <a:spcPct val="100000"/>
-              </a:lnSpc>
-              <a:spcBef>
-                <a:spcPts val="1001"/>
-              </a:spcBef>
-              <a:buClr>
-                <a:srgbClr val="90C226"/>
-              </a:buClr>
-              <a:buSzPct val="80000"/>
-              <a:buFont typeface="Wingdings 3" charset="2"/>
-              <a:buChar char=""/>
-            </a:pPr>
-            <a:r>
-              <a:rPr lang="en-US" sz="1800" b="0" strike="noStrike" spc="-1">
-                <a:solidFill>
-                  <a:srgbClr val="404040"/>
-                </a:solidFill>
-                <a:uFill>
-                  <a:solidFill>
-                    <a:srgbClr val="FFFFFF"/>
-                  </a:solidFill>
-                </a:uFill>
-                <a:latin typeface="Trebuchet MS"/>
-              </a:rPr>
-              <a:t>Objectives:</a:t>
-            </a:r>
-          </a:p>
-          <a:p>
-            <a:pPr marL="743040" lvl="1" indent="-285480">
-              <a:lnSpc>
-                <a:spcPct val="100000"/>
-              </a:lnSpc>
-              <a:spcBef>
-                <a:spcPts val="1001"/>
-              </a:spcBef>
-              <a:buClr>
-                <a:srgbClr val="90C226"/>
-              </a:buClr>
-              <a:buSzPct val="80000"/>
-              <a:buFont typeface="Wingdings 3" charset="2"/>
-              <a:buChar char=""/>
-            </a:pPr>
-            <a:r>
-              <a:rPr lang="en-US" sz="1600" b="0" strike="noStrike" spc="-1">
-                <a:solidFill>
-                  <a:srgbClr val="404040"/>
-                </a:solidFill>
-                <a:uFill>
-                  <a:solidFill>
-                    <a:srgbClr val="FFFFFF"/>
-                  </a:solidFill>
-                </a:uFill>
-                <a:latin typeface="Trebuchet MS"/>
-              </a:rPr>
-              <a:t>API: Provide entry point for data</a:t>
-            </a:r>
-          </a:p>
-          <a:p>
-            <a:pPr marL="743040" lvl="1" indent="-285480">
-              <a:lnSpc>
-                <a:spcPct val="100000"/>
-              </a:lnSpc>
-              <a:spcBef>
-                <a:spcPts val="1001"/>
-              </a:spcBef>
-              <a:buClr>
-                <a:srgbClr val="90C226"/>
-              </a:buClr>
-              <a:buSzPct val="80000"/>
-              <a:buFont typeface="Wingdings 3" charset="2"/>
-              <a:buChar char=""/>
-            </a:pPr>
-            <a:r>
-              <a:rPr lang="en-US" sz="1600" b="0" strike="noStrike" spc="-1">
-                <a:solidFill>
-                  <a:srgbClr val="404040"/>
-                </a:solidFill>
-                <a:uFill>
-                  <a:solidFill>
-                    <a:srgbClr val="FFFFFF"/>
-                  </a:solidFill>
-                </a:uFill>
-                <a:latin typeface="Trebuchet MS"/>
-              </a:rPr>
-              <a:t>Internal State: represent system in memory</a:t>
-            </a:r>
-          </a:p>
-          <a:p>
-            <a:pPr marL="343080" indent="-342720">
-              <a:lnSpc>
-                <a:spcPct val="100000"/>
-              </a:lnSpc>
-              <a:spcBef>
-                <a:spcPts val="1001"/>
-              </a:spcBef>
-              <a:buClr>
-                <a:srgbClr val="90C226"/>
-              </a:buClr>
-              <a:buSzPct val="80000"/>
-              <a:buFont typeface="Wingdings 3" charset="2"/>
-              <a:buChar char=""/>
-            </a:pPr>
-            <a:r>
-              <a:rPr lang="en-US" sz="1800" b="0" strike="noStrike" spc="-1">
-                <a:solidFill>
-                  <a:srgbClr val="404040"/>
-                </a:solidFill>
-                <a:uFill>
-                  <a:solidFill>
-                    <a:srgbClr val="FFFFFF"/>
-                  </a:solidFill>
-                </a:uFill>
-                <a:latin typeface="Trebuchet MS"/>
-              </a:rPr>
-              <a:t>API</a:t>
-            </a:r>
-          </a:p>
-          <a:p>
-            <a:pPr marL="743040" lvl="1" indent="-285480">
-              <a:lnSpc>
-                <a:spcPct val="100000"/>
-              </a:lnSpc>
-              <a:spcBef>
-                <a:spcPts val="1001"/>
-              </a:spcBef>
-              <a:buClr>
-                <a:srgbClr val="90C226"/>
-              </a:buClr>
-              <a:buSzPct val="80000"/>
-              <a:buFont typeface="Wingdings 3" charset="2"/>
-              <a:buChar char=""/>
-            </a:pPr>
-            <a:r>
-              <a:rPr lang="en-US" sz="1600" b="0" strike="noStrike" spc="-1">
-                <a:solidFill>
-                  <a:srgbClr val="404040"/>
-                </a:solidFill>
-                <a:uFill>
-                  <a:solidFill>
-                    <a:srgbClr val="FFFFFF"/>
-                  </a:solidFill>
-                </a:uFill>
-                <a:latin typeface="Trebuchet MS"/>
-              </a:rPr>
-              <a:t>RESTful http endpoint</a:t>
-            </a:r>
-          </a:p>
-          <a:p>
-            <a:pPr marL="743040" lvl="1" indent="-285480">
-              <a:lnSpc>
-                <a:spcPct val="100000"/>
-              </a:lnSpc>
-              <a:spcBef>
-                <a:spcPts val="1001"/>
-              </a:spcBef>
-              <a:buClr>
-                <a:srgbClr val="90C226"/>
-              </a:buClr>
-              <a:buSzPct val="80000"/>
-              <a:buFont typeface="Wingdings 3" charset="2"/>
-              <a:buChar char=""/>
-            </a:pPr>
-            <a:r>
-              <a:rPr lang="en-US" sz="1600" b="0" strike="noStrike" spc="-1">
-                <a:solidFill>
-                  <a:srgbClr val="404040"/>
-                </a:solidFill>
-                <a:uFill>
-                  <a:solidFill>
-                    <a:srgbClr val="FFFFFF"/>
-                  </a:solidFill>
-                </a:uFill>
-                <a:latin typeface="Trebuchet MS"/>
-              </a:rPr>
-              <a:t>Routes mapped to actions</a:t>
-            </a:r>
-          </a:p>
-          <a:p>
-            <a:pPr marL="743040" lvl="1" indent="-285480">
-              <a:lnSpc>
-                <a:spcPct val="100000"/>
-              </a:lnSpc>
-              <a:spcBef>
-                <a:spcPts val="1001"/>
-              </a:spcBef>
-              <a:buClr>
-                <a:srgbClr val="90C226"/>
-              </a:buClr>
-              <a:buSzPct val="80000"/>
-              <a:buFont typeface="Wingdings 3" charset="2"/>
-              <a:buChar char=""/>
-            </a:pPr>
-            <a:r>
-              <a:rPr lang="en-US" sz="1600" b="0" strike="noStrike" spc="-1">
-                <a:solidFill>
-                  <a:srgbClr val="404040"/>
-                </a:solidFill>
-                <a:uFill>
-                  <a:solidFill>
-                    <a:srgbClr val="FFFFFF"/>
-                  </a:solidFill>
-                </a:uFill>
-                <a:latin typeface="Trebuchet MS"/>
-              </a:rPr>
-              <a:t>Pistache</a:t>
-            </a:r>
-          </a:p>
-          <a:p>
-            <a:pPr marL="343080" indent="-342720">
-              <a:lnSpc>
-                <a:spcPct val="100000"/>
-              </a:lnSpc>
-              <a:spcBef>
-                <a:spcPts val="1001"/>
-              </a:spcBef>
-              <a:buClr>
-                <a:srgbClr val="90C226"/>
-              </a:buClr>
-              <a:buSzPct val="80000"/>
-              <a:buFont typeface="Wingdings 3" charset="2"/>
-              <a:buChar char=""/>
-            </a:pPr>
-            <a:r>
-              <a:rPr lang="en-US" sz="1800" b="0" strike="noStrike" spc="-1">
-                <a:solidFill>
-                  <a:srgbClr val="404040"/>
-                </a:solidFill>
-                <a:uFill>
-                  <a:solidFill>
-                    <a:srgbClr val="FFFFFF"/>
-                  </a:solidFill>
-                </a:uFill>
-                <a:latin typeface="Trebuchet MS"/>
-              </a:rPr>
-              <a:t>Internal State</a:t>
-            </a:r>
-          </a:p>
-          <a:p>
-            <a:pPr marL="743040" lvl="1" indent="-285480">
-              <a:lnSpc>
-                <a:spcPct val="100000"/>
-              </a:lnSpc>
-              <a:spcBef>
-                <a:spcPts val="1001"/>
-              </a:spcBef>
-              <a:buClr>
-                <a:srgbClr val="90C226"/>
-              </a:buClr>
-              <a:buSzPct val="80000"/>
-              <a:buFont typeface="Wingdings 3" charset="2"/>
-              <a:buChar char=""/>
-            </a:pPr>
-            <a:r>
-              <a:rPr lang="en-US" sz="1600" b="0" strike="noStrike" spc="-1">
-                <a:solidFill>
-                  <a:srgbClr val="404040"/>
-                </a:solidFill>
-                <a:uFill>
-                  <a:solidFill>
-                    <a:srgbClr val="FFFFFF"/>
-                  </a:solidFill>
-                </a:uFill>
-                <a:latin typeface="Trebuchet MS"/>
-              </a:rPr>
-              <a:t>Six objects</a:t>
-            </a:r>
-          </a:p>
-          <a:p>
-            <a:pPr marL="743040" lvl="1" indent="-285480">
-              <a:lnSpc>
-                <a:spcPct val="100000"/>
-              </a:lnSpc>
-              <a:spcBef>
-                <a:spcPts val="1001"/>
-              </a:spcBef>
-              <a:buClr>
-                <a:srgbClr val="90C226"/>
-              </a:buClr>
-              <a:buSzPct val="80000"/>
-              <a:buFont typeface="Wingdings 3" charset="2"/>
-              <a:buChar char=""/>
-            </a:pPr>
-            <a:r>
-              <a:rPr lang="en-US" sz="1600" b="0" strike="noStrike" spc="-1">
-                <a:solidFill>
-                  <a:srgbClr val="404040"/>
-                </a:solidFill>
-                <a:uFill>
-                  <a:solidFill>
-                    <a:srgbClr val="FFFFFF"/>
-                  </a:solidFill>
-                </a:uFill>
-                <a:latin typeface="Trebuchet MS"/>
-              </a:rPr>
-              <a:t>Four representational</a:t>
-            </a:r>
-          </a:p>
-          <a:p>
-            <a:pPr marL="743040" lvl="1" indent="-285480">
-              <a:lnSpc>
-                <a:spcPct val="100000"/>
-              </a:lnSpc>
-              <a:spcBef>
-                <a:spcPts val="1001"/>
-              </a:spcBef>
-              <a:buClr>
-                <a:srgbClr val="90C226"/>
-              </a:buClr>
-              <a:buSzPct val="80000"/>
-              <a:buFont typeface="Wingdings 3" charset="2"/>
-              <a:buChar char=""/>
-            </a:pPr>
-            <a:r>
-              <a:rPr lang="en-US" sz="1600" b="0" strike="noStrike" spc="-1">
-                <a:solidFill>
-                  <a:srgbClr val="404040"/>
-                </a:solidFill>
-                <a:uFill>
-                  <a:solidFill>
-                    <a:srgbClr val="FFFFFF"/>
-                  </a:solidFill>
-                </a:uFill>
-                <a:latin typeface="Trebuchet MS"/>
-              </a:rPr>
-              <a:t>Two relational</a:t>
-            </a:r>
-          </a:p>
-          <a:p>
-            <a:pPr>
-              <a:lnSpc>
-                <a:spcPct val="100000"/>
-              </a:lnSpc>
-              <a:spcBef>
-                <a:spcPts val="1001"/>
-              </a:spcBef>
-            </a:pPr>
-            <a:endParaRPr lang="en-US" sz="1600" b="0" strike="noStrike" spc="-1">
-              <a:solidFill>
-                <a:srgbClr val="404040"/>
-              </a:solidFill>
-              <a:uFill>
-                <a:solidFill>
-                  <a:srgbClr val="FFFFFF"/>
-                </a:solidFill>
-              </a:uFill>
-              <a:latin typeface="Trebuchet MS"/>
-            </a:endParaRPr>
-          </a:p>
-        </p:txBody>
-      </p:sp>
-    </p:spTree>
-  </p:cSld>
-  <p:clrMapOvr>
-    <a:masterClrMapping/>
-  </p:clrMapOvr>
-  <p:timing>
-    <p:tnLst>
-      <p:par>
-        <p:cTn id="1" dur="indefinite" restart="never" nodeType="tmRoot">
-          <p:childTnLst>
-            <p:seq>
-              <p:cTn id="2" nodeType="mainSeq"/>
-              <p:prevCondLst>
-                <p:cond evt="onPrev" delay="0">
-                  <p:tgtEl>
-                    <p:sldTgt/>
-                  </p:tgtEl>
-                </p:cond>
-              </p:prevCondLst>
-              <p:nextCondLst>
-                <p:cond evt="onNext" delay="0">
-                  <p:tgtEl>
-                    <p:sldTgt/>
-                  </p:tgtEl>
-                </p:cond>
-              </p:nextCondLst>
-            </p:seq>
-          </p:childTnLst>
-        </p:cTn>
-      </p:par>
-    </p:tnLst>
-  </p:timing>
-</p:sld>
-</file>
-
-<file path=ppt/slides/slide7.xml><?xml version="1.0" encoding="utf-8"?>
-<p:sld xmlns:a="http://schemas.openxmlformats.org/drawingml/2006/main" xmlns:r="http://schemas.openxmlformats.org/officeDocument/2006/relationships" xmlns:p="http://schemas.openxmlformats.org/presentationml/2006/main">
-  <p:cSld>
-    <p:spTree>
-      <p:nvGrpSpPr>
-        <p:cNvPr id="1" name=""/>
-        <p:cNvGrpSpPr/>
-        <p:nvPr/>
-      </p:nvGrpSpPr>
-      <p:grpSpPr>
-        <a:xfrm>
-          <a:off x="0" y="0"/>
-          <a:ext cx="0" cy="0"/>
-          <a:chOff x="0" y="0"/>
-          <a:chExt cx="0" cy="0"/>
-        </a:xfrm>
-      </p:grpSpPr>
-      <p:sp>
-        <p:nvSpPr>
-          <p:cNvPr id="130" name="TextShape 1"/>
-          <p:cNvSpPr txBox="1"/>
-          <p:nvPr/>
-        </p:nvSpPr>
-        <p:spPr>
-          <a:xfrm>
-            <a:off x="677160" y="609480"/>
-            <a:ext cx="8596440" cy="743040"/>
-          </a:xfrm>
-          <a:prstGeom prst="rect">
-            <a:avLst/>
-          </a:prstGeom>
-          <a:noFill/>
-          <a:ln>
-            <a:noFill/>
-          </a:ln>
-        </p:spPr>
-        <p:txBody>
-          <a:bodyPr/>
-          <a:lstStyle/>
-          <a:p>
-            <a:pPr>
-              <a:lnSpc>
-                <a:spcPct val="100000"/>
-              </a:lnSpc>
-            </a:pPr>
-            <a:r>
-              <a:rPr lang="en-US" sz="3600" b="0" strike="noStrike" spc="-1">
-                <a:solidFill>
-                  <a:srgbClr val="90C226"/>
-                </a:solidFill>
-                <a:uFill>
-                  <a:solidFill>
-                    <a:srgbClr val="FFFFFF"/>
-                  </a:solidFill>
-                </a:uFill>
-                <a:latin typeface="Trebuchet MS"/>
-              </a:rPr>
-              <a:t>Subsystems – State Composer</a:t>
-            </a:r>
-            <a:endParaRPr lang="en-US" sz="3600" b="0" strike="noStrike" spc="-1">
-              <a:solidFill>
-                <a:srgbClr val="000000"/>
-              </a:solidFill>
-              <a:uFill>
-                <a:solidFill>
-                  <a:srgbClr val="FFFFFF"/>
-                </a:solidFill>
-              </a:uFill>
-              <a:latin typeface="Trebuchet MS"/>
-            </a:endParaRPr>
-          </a:p>
-        </p:txBody>
-      </p:sp>
-      <p:sp>
-        <p:nvSpPr>
-          <p:cNvPr id="131" name="TextShape 2"/>
-          <p:cNvSpPr txBox="1"/>
-          <p:nvPr/>
-        </p:nvSpPr>
-        <p:spPr>
-          <a:xfrm>
-            <a:off x="677160" y="1684800"/>
-            <a:ext cx="8596440" cy="4930200"/>
-          </a:xfrm>
-          <a:prstGeom prst="rect">
-            <a:avLst/>
-          </a:prstGeom>
-          <a:noFill/>
-          <a:ln>
-            <a:noFill/>
-          </a:ln>
-        </p:spPr>
-        <p:txBody>
-          <a:bodyPr>
-            <a:normAutofit/>
-          </a:bodyPr>
-          <a:lstStyle/>
-          <a:p>
-            <a:pPr marL="343080" indent="-342720">
-              <a:lnSpc>
-                <a:spcPct val="100000"/>
-              </a:lnSpc>
-              <a:spcBef>
-                <a:spcPts val="1001"/>
-              </a:spcBef>
-              <a:buClr>
-                <a:srgbClr val="90C226"/>
-              </a:buClr>
-              <a:buSzPct val="80000"/>
-              <a:buFont typeface="Wingdings 3" charset="2"/>
-              <a:buChar char=""/>
-            </a:pPr>
-            <a:r>
-              <a:rPr lang="en-US" sz="1800" b="0" strike="noStrike" spc="-1">
-                <a:solidFill>
-                  <a:srgbClr val="404040"/>
-                </a:solidFill>
-                <a:uFill>
-                  <a:solidFill>
-                    <a:srgbClr val="FFFFFF"/>
-                  </a:solidFill>
-                </a:uFill>
-                <a:latin typeface="Trebuchet MS"/>
-              </a:rPr>
-              <a:t>Objectives: </a:t>
-            </a:r>
-          </a:p>
-          <a:p>
-            <a:pPr marL="743040" lvl="1" indent="-285480">
-              <a:lnSpc>
-                <a:spcPct val="100000"/>
-              </a:lnSpc>
-              <a:spcBef>
-                <a:spcPts val="1001"/>
-              </a:spcBef>
-              <a:buClr>
-                <a:srgbClr val="90C226"/>
-              </a:buClr>
-              <a:buSzPct val="80000"/>
-              <a:buFont typeface="Wingdings 3" charset="2"/>
-              <a:buChar char=""/>
-            </a:pPr>
-            <a:r>
-              <a:rPr lang="en-US" sz="1600" b="0" strike="noStrike" spc="-1">
-                <a:solidFill>
-                  <a:srgbClr val="404040"/>
-                </a:solidFill>
-                <a:uFill>
-                  <a:solidFill>
-                    <a:srgbClr val="FFFFFF"/>
-                  </a:solidFill>
-                </a:uFill>
-                <a:latin typeface="Trebuchet MS"/>
-              </a:rPr>
-              <a:t>Collect the Internal State’s currently running profile</a:t>
-            </a:r>
-          </a:p>
-          <a:p>
-            <a:pPr marL="743040" lvl="1" indent="-285480">
-              <a:lnSpc>
-                <a:spcPct val="100000"/>
-              </a:lnSpc>
-              <a:spcBef>
-                <a:spcPts val="1001"/>
-              </a:spcBef>
-              <a:buClr>
-                <a:srgbClr val="90C226"/>
-              </a:buClr>
-              <a:buSzPct val="80000"/>
-              <a:buFont typeface="Wingdings 3" charset="2"/>
-              <a:buChar char=""/>
-            </a:pPr>
-            <a:r>
-              <a:rPr lang="en-US" sz="1600" b="0" strike="noStrike" spc="-1">
-                <a:solidFill>
-                  <a:srgbClr val="404040"/>
-                </a:solidFill>
-                <a:uFill>
-                  <a:solidFill>
-                    <a:srgbClr val="FFFFFF"/>
-                  </a:solidFill>
-                </a:uFill>
-                <a:latin typeface="Trebuchet MS"/>
-              </a:rPr>
-              <a:t>Gather all virtual LEDs and transpose onto the actual LEDs</a:t>
-            </a:r>
-          </a:p>
-          <a:p>
-            <a:pPr marL="343080" indent="-342720">
-              <a:lnSpc>
-                <a:spcPct val="100000"/>
-              </a:lnSpc>
-              <a:spcBef>
-                <a:spcPts val="1001"/>
-              </a:spcBef>
-              <a:buClr>
-                <a:srgbClr val="90C226"/>
-              </a:buClr>
-              <a:buSzPct val="80000"/>
-              <a:buFont typeface="Wingdings 3" charset="2"/>
-              <a:buChar char=""/>
-            </a:pPr>
-            <a:r>
-              <a:rPr lang="en-US" sz="1800" b="0" strike="noStrike" spc="-1">
-                <a:solidFill>
-                  <a:srgbClr val="404040"/>
-                </a:solidFill>
-                <a:uFill>
-                  <a:solidFill>
-                    <a:srgbClr val="FFFFFF"/>
-                  </a:solidFill>
-                </a:uFill>
-                <a:latin typeface="Trebuchet MS"/>
-              </a:rPr>
-              <a:t>Algorithm Psuedocode</a:t>
-            </a:r>
-          </a:p>
-          <a:p>
-            <a:pPr marL="743040" lvl="1" indent="-285480">
-              <a:lnSpc>
-                <a:spcPct val="100000"/>
-              </a:lnSpc>
-              <a:spcBef>
-                <a:spcPts val="1001"/>
-              </a:spcBef>
-              <a:buClr>
-                <a:srgbClr val="90C226"/>
-              </a:buClr>
-              <a:buSzPct val="80000"/>
-              <a:buFont typeface="Wingdings 3" charset="2"/>
-              <a:buChar char=""/>
-            </a:pPr>
-            <a:r>
-              <a:rPr lang="en-US" sz="1600" b="0" strike="noStrike" spc="-1">
-                <a:solidFill>
-                  <a:srgbClr val="404040"/>
-                </a:solidFill>
-                <a:uFill>
-                  <a:solidFill>
-                    <a:srgbClr val="FFFFFF"/>
-                  </a:solidFill>
-                </a:uFill>
-                <a:latin typeface="Trebuchet MS"/>
-              </a:rPr>
-              <a:t>Get the current active profile from the state</a:t>
-            </a:r>
-          </a:p>
-          <a:p>
-            <a:pPr marL="743040" lvl="1" indent="-285480">
-              <a:lnSpc>
-                <a:spcPct val="100000"/>
-              </a:lnSpc>
-              <a:spcBef>
-                <a:spcPts val="1001"/>
-              </a:spcBef>
-              <a:buClr>
-                <a:srgbClr val="90C226"/>
-              </a:buClr>
-              <a:buSzPct val="80000"/>
-              <a:buFont typeface="Wingdings 3" charset="2"/>
-              <a:buChar char=""/>
-            </a:pPr>
-            <a:r>
-              <a:rPr lang="en-US" sz="1600" b="0" strike="noStrike" spc="-1">
-                <a:solidFill>
-                  <a:srgbClr val="404040"/>
-                </a:solidFill>
-                <a:uFill>
-                  <a:solidFill>
-                    <a:srgbClr val="FFFFFF"/>
-                  </a:solidFill>
-                </a:uFill>
-                <a:latin typeface="Trebuchet MS"/>
-              </a:rPr>
-              <a:t>For the zones in the profile</a:t>
-            </a:r>
-          </a:p>
-          <a:p>
-            <a:pPr marL="1143000" lvl="2" indent="-228240">
-              <a:lnSpc>
-                <a:spcPct val="100000"/>
-              </a:lnSpc>
-              <a:spcBef>
-                <a:spcPts val="1001"/>
-              </a:spcBef>
-              <a:buClr>
-                <a:srgbClr val="90C226"/>
-              </a:buClr>
-              <a:buSzPct val="80000"/>
-              <a:buFont typeface="Wingdings 3" charset="2"/>
-              <a:buChar char=""/>
-            </a:pPr>
-            <a:r>
-              <a:rPr lang="en-US" sz="1400" b="0" strike="noStrike" spc="-1">
-                <a:solidFill>
-                  <a:srgbClr val="404040"/>
-                </a:solidFill>
-                <a:uFill>
-                  <a:solidFill>
-                    <a:srgbClr val="FFFFFF"/>
-                  </a:solidFill>
-                </a:uFill>
-                <a:latin typeface="Trebuchet MS"/>
-              </a:rPr>
-              <a:t>Get the zone state (intensity, colors, powered)</a:t>
-            </a:r>
-          </a:p>
-          <a:p>
-            <a:pPr marL="1143000" lvl="2" indent="-228240">
-              <a:lnSpc>
-                <a:spcPct val="100000"/>
-              </a:lnSpc>
-              <a:spcBef>
-                <a:spcPts val="1001"/>
-              </a:spcBef>
-              <a:buClr>
-                <a:srgbClr val="90C226"/>
-              </a:buClr>
-              <a:buSzPct val="80000"/>
-              <a:buFont typeface="Wingdings 3" charset="2"/>
-              <a:buChar char=""/>
-            </a:pPr>
-            <a:r>
-              <a:rPr lang="en-US" sz="1400" b="0" strike="noStrike" spc="-1">
-                <a:solidFill>
-                  <a:srgbClr val="404040"/>
-                </a:solidFill>
-                <a:uFill>
-                  <a:solidFill>
-                    <a:srgbClr val="FFFFFF"/>
-                  </a:solidFill>
-                </a:uFill>
-                <a:latin typeface="Trebuchet MS"/>
-              </a:rPr>
-              <a:t>Get the zone LEDs (virtual)</a:t>
-            </a:r>
-          </a:p>
-          <a:p>
-            <a:pPr marL="1143000" lvl="2" indent="-228240">
-              <a:lnSpc>
-                <a:spcPct val="100000"/>
-              </a:lnSpc>
-              <a:spcBef>
-                <a:spcPts val="1001"/>
-              </a:spcBef>
-              <a:buClr>
-                <a:srgbClr val="90C226"/>
-              </a:buClr>
-              <a:buSzPct val="80000"/>
-              <a:buFont typeface="Wingdings 3" charset="2"/>
-              <a:buChar char=""/>
-            </a:pPr>
-            <a:r>
-              <a:rPr lang="en-US" sz="1400" b="0" strike="noStrike" spc="-1">
-                <a:solidFill>
-                  <a:srgbClr val="404040"/>
-                </a:solidFill>
-                <a:uFill>
-                  <a:solidFill>
-                    <a:srgbClr val="FFFFFF"/>
-                  </a:solidFill>
-                </a:uFill>
-                <a:latin typeface="Trebuchet MS"/>
-              </a:rPr>
-              <a:t>For the LEDs in the zone</a:t>
-            </a:r>
-          </a:p>
-          <a:p>
-            <a:pPr marL="1600200" lvl="3" indent="-228240">
-              <a:lnSpc>
-                <a:spcPct val="100000"/>
-              </a:lnSpc>
-              <a:spcBef>
-                <a:spcPts val="1001"/>
-              </a:spcBef>
-              <a:buClr>
-                <a:srgbClr val="90C226"/>
-              </a:buClr>
-              <a:buSzPct val="80000"/>
-              <a:buFont typeface="Wingdings 3" charset="2"/>
-              <a:buChar char=""/>
-            </a:pPr>
-            <a:r>
-              <a:rPr lang="en-US" sz="1200" b="0" strike="noStrike" spc="-1">
-                <a:solidFill>
-                  <a:srgbClr val="404040"/>
-                </a:solidFill>
-                <a:uFill>
-                  <a:solidFill>
-                    <a:srgbClr val="FFFFFF"/>
-                  </a:solidFill>
-                </a:uFill>
-                <a:latin typeface="Trebuchet MS"/>
-              </a:rPr>
-              <a:t>Get the LED controller</a:t>
-            </a:r>
-          </a:p>
-          <a:p>
-            <a:pPr marL="1600200" lvl="3" indent="-228240">
-              <a:lnSpc>
-                <a:spcPct val="100000"/>
-              </a:lnSpc>
-              <a:spcBef>
-                <a:spcPts val="1001"/>
-              </a:spcBef>
-              <a:buClr>
-                <a:srgbClr val="90C226"/>
-              </a:buClr>
-              <a:buSzPct val="80000"/>
-              <a:buFont typeface="Wingdings 3" charset="2"/>
-              <a:buChar char=""/>
-            </a:pPr>
-            <a:r>
-              <a:rPr lang="en-US" sz="1200" b="0" strike="noStrike" spc="-1">
-                <a:solidFill>
-                  <a:srgbClr val="404040"/>
-                </a:solidFill>
-                <a:uFill>
-                  <a:solidFill>
-                    <a:srgbClr val="FFFFFF"/>
-                  </a:solidFill>
-                </a:uFill>
-                <a:latin typeface="Trebuchet MS"/>
-              </a:rPr>
-              <a:t>Get the controller’s IO port</a:t>
-            </a:r>
-          </a:p>
-          <a:p>
-            <a:pPr marL="1600200" lvl="3" indent="-228240">
-              <a:lnSpc>
-                <a:spcPct val="100000"/>
-              </a:lnSpc>
-              <a:spcBef>
-                <a:spcPts val="1001"/>
-              </a:spcBef>
-              <a:buClr>
-                <a:srgbClr val="90C226"/>
-              </a:buClr>
-              <a:buSzPct val="80000"/>
-              <a:buFont typeface="Wingdings 3" charset="2"/>
-              <a:buChar char=""/>
-            </a:pPr>
-            <a:r>
-              <a:rPr lang="en-US" sz="1200" b="0" strike="noStrike" spc="-1">
-                <a:solidFill>
-                  <a:srgbClr val="404040"/>
-                </a:solidFill>
-                <a:uFill>
-                  <a:solidFill>
-                    <a:srgbClr val="FFFFFF"/>
-                  </a:solidFill>
-                </a:uFill>
-                <a:latin typeface="Trebuchet MS"/>
-              </a:rPr>
-              <a:t>Get the LED’s index on the controller</a:t>
-            </a:r>
-          </a:p>
-          <a:p>
-            <a:pPr marL="1600200" lvl="3" indent="-228240">
-              <a:lnSpc>
-                <a:spcPct val="100000"/>
-              </a:lnSpc>
-              <a:spcBef>
-                <a:spcPts val="1001"/>
-              </a:spcBef>
-              <a:buClr>
-                <a:srgbClr val="90C226"/>
-              </a:buClr>
-              <a:buSzPct val="80000"/>
-              <a:buFont typeface="Wingdings 3" charset="2"/>
-              <a:buChar char=""/>
-            </a:pPr>
-            <a:r>
-              <a:rPr lang="en-US" sz="1200" b="0" strike="noStrike" spc="-1">
-                <a:solidFill>
-                  <a:srgbClr val="404040"/>
-                </a:solidFill>
-                <a:uFill>
-                  <a:solidFill>
-                    <a:srgbClr val="FFFFFF"/>
-                  </a:solidFill>
-                </a:uFill>
-                <a:latin typeface="Trebuchet MS"/>
-              </a:rPr>
-              <a:t>Calculate the RGB values to send</a:t>
-            </a:r>
-          </a:p>
-          <a:p>
-            <a:pPr marL="1600200" lvl="3" indent="-228240">
-              <a:lnSpc>
-                <a:spcPct val="100000"/>
-              </a:lnSpc>
-              <a:spcBef>
-                <a:spcPts val="1001"/>
-              </a:spcBef>
-              <a:buClr>
-                <a:srgbClr val="90C226"/>
-              </a:buClr>
-              <a:buSzPct val="80000"/>
-              <a:buFont typeface="Wingdings 3" charset="2"/>
-              <a:buChar char=""/>
-            </a:pPr>
-            <a:r>
-              <a:rPr lang="en-US" sz="1200" b="0" strike="noStrike" spc="-1">
-                <a:solidFill>
-                  <a:srgbClr val="404040"/>
-                </a:solidFill>
-                <a:uFill>
-                  <a:solidFill>
-                    <a:srgbClr val="FFFFFF"/>
-                  </a:solidFill>
-                </a:uFill>
-                <a:latin typeface="Trebuchet MS"/>
-              </a:rPr>
-              <a:t>Send the LED to the proper controller via UART serial</a:t>
-            </a:r>
-          </a:p>
-        </p:txBody>
-      </p:sp>
-    </p:spTree>
-  </p:cSld>
-  <p:clrMapOvr>
-    <a:masterClrMapping/>
-  </p:clrMapOvr>
-  <p:timing>
-    <p:tnLst>
-      <p:par>
-        <p:cTn id="1" dur="indefinite" restart="never" nodeType="tmRoot">
-          <p:childTnLst>
-            <p:seq>
-              <p:cTn id="2" nodeType="mainSeq"/>
-              <p:prevCondLst>
-                <p:cond evt="onPrev" delay="0">
-                  <p:tgtEl>
-                    <p:sldTgt/>
-                  </p:tgtEl>
-                </p:cond>
-              </p:prevCondLst>
-              <p:nextCondLst>
-                <p:cond evt="onNext" delay="0">
-                  <p:tgtEl>
-                    <p:sldTgt/>
-                  </p:tgtEl>
-                </p:cond>
-              </p:nextCondLst>
-            </p:seq>
-          </p:childTnLst>
-        </p:cTn>
-      </p:par>
-    </p:tnLst>
-  </p:timing>
-</p:sld>
-</file>
-
-<file path=ppt/slides/slide8.xml><?xml version="1.0" encoding="utf-8"?>
-<p:sld xmlns:a="http://schemas.openxmlformats.org/drawingml/2006/main" xmlns:r="http://schemas.openxmlformats.org/officeDocument/2006/relationships" xmlns:p="http://schemas.openxmlformats.org/presentationml/2006/main">
-  <p:cSld>
-    <p:spTree>
-      <p:nvGrpSpPr>
-        <p:cNvPr id="1" name=""/>
-        <p:cNvGrpSpPr/>
-        <p:nvPr/>
-      </p:nvGrpSpPr>
-      <p:grpSpPr>
-        <a:xfrm>
-          <a:off x="0" y="0"/>
-          <a:ext cx="0" cy="0"/>
-          <a:chOff x="0" y="0"/>
-          <a:chExt cx="0" cy="0"/>
-        </a:xfrm>
-      </p:grpSpPr>
-      <p:sp>
-        <p:nvSpPr>
-          <p:cNvPr id="132" name="TextShape 1"/>
-          <p:cNvSpPr txBox="1"/>
-          <p:nvPr/>
-        </p:nvSpPr>
-        <p:spPr>
-          <a:xfrm>
-            <a:off x="677160" y="609480"/>
-            <a:ext cx="8596440" cy="743040"/>
-          </a:xfrm>
-          <a:prstGeom prst="rect">
-            <a:avLst/>
-          </a:prstGeom>
-          <a:noFill/>
-          <a:ln>
-            <a:noFill/>
-          </a:ln>
-        </p:spPr>
-        <p:txBody>
-          <a:bodyPr/>
-          <a:lstStyle/>
-          <a:p>
-            <a:pPr>
-              <a:lnSpc>
-                <a:spcPct val="100000"/>
-              </a:lnSpc>
-            </a:pPr>
-            <a:r>
-              <a:rPr lang="en-US" sz="3600" b="0" strike="noStrike" spc="-1">
-                <a:solidFill>
-                  <a:srgbClr val="90C226"/>
-                </a:solidFill>
-                <a:uFill>
-                  <a:solidFill>
-                    <a:srgbClr val="FFFFFF"/>
-                  </a:solidFill>
-                </a:uFill>
-                <a:latin typeface="Trebuchet MS"/>
-              </a:rPr>
-              <a:t>Subsystems – LED Controller</a:t>
-            </a:r>
-            <a:endParaRPr lang="en-US" sz="3600" b="0" strike="noStrike" spc="-1">
-              <a:solidFill>
-                <a:srgbClr val="000000"/>
-              </a:solidFill>
-              <a:uFill>
-                <a:solidFill>
-                  <a:srgbClr val="FFFFFF"/>
-                </a:solidFill>
-              </a:uFill>
-              <a:latin typeface="Trebuchet MS"/>
-            </a:endParaRPr>
-          </a:p>
-        </p:txBody>
-      </p:sp>
-      <p:sp>
-        <p:nvSpPr>
-          <p:cNvPr id="133" name="TextShape 2"/>
-          <p:cNvSpPr txBox="1"/>
-          <p:nvPr/>
-        </p:nvSpPr>
-        <p:spPr>
-          <a:xfrm>
-            <a:off x="677160" y="2160720"/>
-            <a:ext cx="8596440" cy="3880440"/>
-          </a:xfrm>
-          <a:prstGeom prst="rect">
-            <a:avLst/>
-          </a:prstGeom>
-          <a:noFill/>
-          <a:ln>
-            <a:noFill/>
-          </a:ln>
-        </p:spPr>
-        <p:txBody>
-          <a:bodyPr/>
-          <a:lstStyle/>
-          <a:p>
-            <a:pPr marL="343080" indent="-342720">
-              <a:lnSpc>
-                <a:spcPct val="100000"/>
-              </a:lnSpc>
-              <a:spcBef>
-                <a:spcPts val="1001"/>
-              </a:spcBef>
-              <a:buClr>
-                <a:srgbClr val="90C226"/>
-              </a:buClr>
-              <a:buSzPct val="80000"/>
-              <a:buFont typeface="Wingdings 3" charset="2"/>
-              <a:buChar char=""/>
-            </a:pPr>
-            <a:r>
-              <a:rPr lang="en-US" sz="1800" b="0" strike="noStrike" spc="-1">
-                <a:solidFill>
-                  <a:srgbClr val="404040"/>
-                </a:solidFill>
-                <a:uFill>
-                  <a:solidFill>
-                    <a:srgbClr val="FFFFFF"/>
-                  </a:solidFill>
-                </a:uFill>
-                <a:latin typeface="Trebuchet MS"/>
-              </a:rPr>
-              <a:t>Objective: Send data from the state composer to the LED registers</a:t>
-            </a:r>
-          </a:p>
-          <a:p>
-            <a:pPr marL="743040" lvl="1" indent="-285480">
-              <a:lnSpc>
-                <a:spcPct val="100000"/>
-              </a:lnSpc>
-              <a:spcBef>
-                <a:spcPts val="1001"/>
-              </a:spcBef>
-              <a:buClr>
-                <a:srgbClr val="90C226"/>
-              </a:buClr>
-              <a:buSzPct val="80000"/>
-              <a:buFont typeface="Wingdings 3" charset="2"/>
-              <a:buChar char=""/>
-            </a:pPr>
-            <a:r>
-              <a:rPr lang="en-US" sz="1600" b="0" strike="noStrike" spc="-1">
-                <a:solidFill>
-                  <a:srgbClr val="404040"/>
-                </a:solidFill>
-                <a:uFill>
-                  <a:solidFill>
-                    <a:srgbClr val="FFFFFF"/>
-                  </a:solidFill>
-                </a:uFill>
-                <a:latin typeface="Trebuchet MS"/>
-              </a:rPr>
-              <a:t>Create LED color object</a:t>
-            </a:r>
-          </a:p>
-          <a:p>
-            <a:pPr marL="743040" lvl="1" indent="-285480">
-              <a:lnSpc>
-                <a:spcPct val="100000"/>
-              </a:lnSpc>
-              <a:spcBef>
-                <a:spcPts val="1001"/>
-              </a:spcBef>
-              <a:buClr>
-                <a:srgbClr val="90C226"/>
-              </a:buClr>
-              <a:buSzPct val="80000"/>
-              <a:buFont typeface="Wingdings 3" charset="2"/>
-              <a:buChar char=""/>
-            </a:pPr>
-            <a:r>
-              <a:rPr lang="en-US" sz="1600" b="0" strike="noStrike" spc="-1">
-                <a:solidFill>
-                  <a:srgbClr val="404040"/>
-                </a:solidFill>
-                <a:uFill>
-                  <a:solidFill>
-                    <a:srgbClr val="FFFFFF"/>
-                  </a:solidFill>
-                </a:uFill>
-                <a:latin typeface="Trebuchet MS"/>
-              </a:rPr>
-              <a:t>Set RX and TX pin modes</a:t>
-            </a:r>
-          </a:p>
-          <a:p>
-            <a:pPr marL="743040" lvl="1" indent="-285480">
-              <a:lnSpc>
-                <a:spcPct val="100000"/>
-              </a:lnSpc>
-              <a:spcBef>
-                <a:spcPts val="1001"/>
-              </a:spcBef>
-              <a:buClr>
-                <a:srgbClr val="90C226"/>
-              </a:buClr>
-              <a:buSzPct val="80000"/>
-              <a:buFont typeface="Wingdings 3" charset="2"/>
-              <a:buChar char=""/>
-            </a:pPr>
-            <a:r>
-              <a:rPr lang="en-US" sz="1600" b="0" strike="noStrike" spc="-1">
-                <a:solidFill>
-                  <a:srgbClr val="404040"/>
-                </a:solidFill>
-                <a:uFill>
-                  <a:solidFill>
-                    <a:srgbClr val="FFFFFF"/>
-                  </a:solidFill>
-                </a:uFill>
-                <a:latin typeface="Trebuchet MS"/>
-              </a:rPr>
-              <a:t>If Serial buffer is not empty</a:t>
-            </a:r>
-          </a:p>
-          <a:p>
-            <a:pPr marL="1143000" lvl="2" indent="-228240">
-              <a:lnSpc>
-                <a:spcPct val="100000"/>
-              </a:lnSpc>
-              <a:spcBef>
-                <a:spcPts val="1001"/>
-              </a:spcBef>
-              <a:buClr>
-                <a:srgbClr val="90C226"/>
-              </a:buClr>
-              <a:buSzPct val="80000"/>
-              <a:buFont typeface="Wingdings 3" charset="2"/>
-              <a:buChar char=""/>
-            </a:pPr>
-            <a:r>
-              <a:rPr lang="en-US" sz="1400" b="0" strike="noStrike" spc="-1">
-                <a:solidFill>
-                  <a:srgbClr val="404040"/>
-                </a:solidFill>
-                <a:uFill>
-                  <a:solidFill>
-                    <a:srgbClr val="FFFFFF"/>
-                  </a:solidFill>
-                </a:uFill>
-                <a:latin typeface="Trebuchet MS"/>
-              </a:rPr>
-              <a:t>Read LED index</a:t>
-            </a:r>
-          </a:p>
-          <a:p>
-            <a:pPr marL="1143000" lvl="2" indent="-228240">
-              <a:lnSpc>
-                <a:spcPct val="100000"/>
-              </a:lnSpc>
-              <a:spcBef>
-                <a:spcPts val="1001"/>
-              </a:spcBef>
-              <a:buClr>
-                <a:srgbClr val="90C226"/>
-              </a:buClr>
-              <a:buSzPct val="80000"/>
-              <a:buFont typeface="Wingdings 3" charset="2"/>
-              <a:buChar char=""/>
-            </a:pPr>
-            <a:r>
-              <a:rPr lang="en-US" sz="1400" b="0" strike="noStrike" spc="-1">
-                <a:solidFill>
-                  <a:srgbClr val="404040"/>
-                </a:solidFill>
-                <a:uFill>
-                  <a:solidFill>
-                    <a:srgbClr val="FFFFFF"/>
-                  </a:solidFill>
-                </a:uFill>
-                <a:latin typeface="Trebuchet MS"/>
-              </a:rPr>
-              <a:t>Read red value</a:t>
-            </a:r>
-          </a:p>
-          <a:p>
-            <a:pPr marL="1143000" lvl="2" indent="-228240">
-              <a:lnSpc>
-                <a:spcPct val="100000"/>
-              </a:lnSpc>
-              <a:spcBef>
-                <a:spcPts val="1001"/>
-              </a:spcBef>
-              <a:buClr>
-                <a:srgbClr val="90C226"/>
-              </a:buClr>
-              <a:buSzPct val="80000"/>
-              <a:buFont typeface="Wingdings 3" charset="2"/>
-              <a:buChar char=""/>
-            </a:pPr>
-            <a:r>
-              <a:rPr lang="en-US" sz="1400" b="0" strike="noStrike" spc="-1">
-                <a:solidFill>
-                  <a:srgbClr val="404040"/>
-                </a:solidFill>
-                <a:uFill>
-                  <a:solidFill>
-                    <a:srgbClr val="FFFFFF"/>
-                  </a:solidFill>
-                </a:uFill>
-                <a:latin typeface="Trebuchet MS"/>
-              </a:rPr>
-              <a:t>Read green value</a:t>
-            </a:r>
-          </a:p>
-          <a:p>
-            <a:pPr marL="1143000" lvl="2" indent="-228240">
-              <a:lnSpc>
-                <a:spcPct val="100000"/>
-              </a:lnSpc>
-              <a:spcBef>
-                <a:spcPts val="1001"/>
-              </a:spcBef>
-              <a:buClr>
-                <a:srgbClr val="90C226"/>
-              </a:buClr>
-              <a:buSzPct val="80000"/>
-              <a:buFont typeface="Wingdings 3" charset="2"/>
-              <a:buChar char=""/>
-            </a:pPr>
-            <a:r>
-              <a:rPr lang="en-US" sz="1400" b="0" strike="noStrike" spc="-1">
-                <a:solidFill>
-                  <a:srgbClr val="404040"/>
-                </a:solidFill>
-                <a:uFill>
-                  <a:solidFill>
-                    <a:srgbClr val="FFFFFF"/>
-                  </a:solidFill>
-                </a:uFill>
-                <a:latin typeface="Trebuchet MS"/>
-              </a:rPr>
-              <a:t>Read blue value</a:t>
-            </a:r>
-          </a:p>
-          <a:p>
-            <a:pPr marL="1143000" lvl="2" indent="-228240">
-              <a:lnSpc>
-                <a:spcPct val="100000"/>
-              </a:lnSpc>
-              <a:spcBef>
-                <a:spcPts val="1001"/>
-              </a:spcBef>
-              <a:buClr>
-                <a:srgbClr val="90C226"/>
-              </a:buClr>
-              <a:buSzPct val="80000"/>
-              <a:buFont typeface="Wingdings 3" charset="2"/>
-              <a:buChar char=""/>
-            </a:pPr>
-            <a:r>
-              <a:rPr lang="en-US" sz="1400" b="0" strike="noStrike" spc="-1">
-                <a:solidFill>
-                  <a:srgbClr val="404040"/>
-                </a:solidFill>
-                <a:uFill>
-                  <a:solidFill>
-                    <a:srgbClr val="FFFFFF"/>
-                  </a:solidFill>
-                </a:uFill>
-                <a:latin typeface="Trebuchet MS"/>
-              </a:rPr>
-              <a:t>Set RGB values for given LED index</a:t>
-            </a:r>
-          </a:p>
-        </p:txBody>
-      </p:sp>
-    </p:spTree>
-  </p:cSld>
-  <p:clrMapOvr>
-    <a:masterClrMapping/>
-  </p:clrMapOvr>
-  <p:timing>
-    <p:tnLst>
-      <p:par>
-        <p:cTn id="1" dur="indefinite" restart="never" nodeType="tmRoot">
-          <p:childTnLst>
-            <p:seq>
-              <p:cTn id="2" nodeType="mainSeq"/>
-              <p:prevCondLst>
-                <p:cond evt="onPrev" delay="0">
-                  <p:tgtEl>
-                    <p:sldTgt/>
-                  </p:tgtEl>
-                </p:cond>
-              </p:prevCondLst>
-              <p:nextCondLst>
-                <p:cond evt="onNext" delay="0">
-                  <p:tgtEl>
-                    <p:sldTgt/>
-                  </p:tgtEl>
-                </p:cond>
-              </p:nextCondLst>
-            </p:seq>
-          </p:childTnLst>
-        </p:cTn>
-      </p:par>
-    </p:tnLst>
-  </p:timing>
-</p:sld>
-</file>
-
-<file path=ppt/slides/slide9.xml><?xml version="1.0" encoding="utf-8"?>
-<p:sld xmlns:a="http://schemas.openxmlformats.org/drawingml/2006/main" xmlns:r="http://schemas.openxmlformats.org/officeDocument/2006/relationships" xmlns:p="http://schemas.openxmlformats.org/presentationml/2006/main">
-  <p:cSld>
-    <p:spTree>
-      <p:nvGrpSpPr>
-        <p:cNvPr id="1" name=""/>
-        <p:cNvGrpSpPr/>
-        <p:nvPr/>
-      </p:nvGrpSpPr>
-      <p:grpSpPr>
-        <a:xfrm>
-          <a:off x="0" y="0"/>
-          <a:ext cx="0" cy="0"/>
-          <a:chOff x="0" y="0"/>
-          <a:chExt cx="0" cy="0"/>
-        </a:xfrm>
-      </p:grpSpPr>
-      <p:sp>
-        <p:nvSpPr>
-          <p:cNvPr id="134" name="TextShape 1"/>
-          <p:cNvSpPr txBox="1"/>
-          <p:nvPr/>
-        </p:nvSpPr>
-        <p:spPr>
-          <a:xfrm>
-            <a:off x="677160" y="609480"/>
-            <a:ext cx="8596440" cy="817560"/>
-          </a:xfrm>
-          <a:prstGeom prst="rect">
-            <a:avLst/>
-          </a:prstGeom>
-          <a:noFill/>
-          <a:ln>
-            <a:noFill/>
-          </a:ln>
-        </p:spPr>
-        <p:txBody>
-          <a:bodyPr/>
-          <a:lstStyle/>
-          <a:p>
-            <a:pPr>
-              <a:lnSpc>
-                <a:spcPct val="100000"/>
-              </a:lnSpc>
-            </a:pPr>
-            <a:r>
-              <a:rPr lang="en-US" sz="3600" b="0" strike="noStrike" spc="-1">
-                <a:solidFill>
-                  <a:srgbClr val="90C226"/>
-                </a:solidFill>
-                <a:uFill>
-                  <a:solidFill>
-                    <a:srgbClr val="FFFFFF"/>
-                  </a:solidFill>
-                </a:uFill>
-                <a:latin typeface="Trebuchet MS"/>
-              </a:rPr>
-              <a:t>Struggles</a:t>
-            </a:r>
-            <a:endParaRPr lang="en-US" sz="3600" b="0" strike="noStrike" spc="-1">
-              <a:solidFill>
-                <a:srgbClr val="000000"/>
-              </a:solidFill>
-              <a:uFill>
-                <a:solidFill>
-                  <a:srgbClr val="FFFFFF"/>
-                </a:solidFill>
-              </a:uFill>
-              <a:latin typeface="Trebuchet MS"/>
-            </a:endParaRPr>
-          </a:p>
-        </p:txBody>
-      </p:sp>
-      <p:sp>
-        <p:nvSpPr>
-          <p:cNvPr id="135" name="TextShape 2"/>
-          <p:cNvSpPr txBox="1"/>
-          <p:nvPr/>
-        </p:nvSpPr>
-        <p:spPr>
-          <a:xfrm>
-            <a:off x="677160" y="2160720"/>
-            <a:ext cx="8596440" cy="3880440"/>
-          </a:xfrm>
-          <a:prstGeom prst="rect">
-            <a:avLst/>
-          </a:prstGeom>
-          <a:noFill/>
-          <a:ln>
-            <a:noFill/>
-          </a:ln>
-        </p:spPr>
-        <p:txBody>
-          <a:bodyPr/>
-          <a:lstStyle/>
-          <a:p>
-            <a:pPr marL="343080" indent="-342720">
-              <a:lnSpc>
-                <a:spcPct val="100000"/>
-              </a:lnSpc>
-              <a:spcBef>
-                <a:spcPts val="1001"/>
-              </a:spcBef>
-              <a:buClr>
-                <a:srgbClr val="90C226"/>
-              </a:buClr>
-              <a:buSzPct val="80000"/>
-              <a:buFont typeface="Wingdings 3" charset="2"/>
-              <a:buChar char=""/>
-            </a:pPr>
-            <a:r>
-              <a:rPr lang="en-US" sz="1800" b="0" strike="noStrike" spc="-1">
-                <a:solidFill>
-                  <a:srgbClr val="404040"/>
-                </a:solidFill>
-                <a:uFill>
-                  <a:solidFill>
-                    <a:srgbClr val="FFFFFF"/>
-                  </a:solidFill>
-                </a:uFill>
-                <a:latin typeface="Trebuchet MS"/>
-              </a:rPr>
-              <a:t>Communication between the Arduino Nano and the Raspberry pi</a:t>
-            </a:r>
-          </a:p>
-          <a:p>
-            <a:pPr marL="743040" lvl="1" indent="-285480">
-              <a:lnSpc>
-                <a:spcPct val="100000"/>
-              </a:lnSpc>
-              <a:spcBef>
-                <a:spcPts val="1001"/>
-              </a:spcBef>
-              <a:buClr>
-                <a:srgbClr val="90C226"/>
-              </a:buClr>
-              <a:buSzPct val="80000"/>
-              <a:buFont typeface="Wingdings 3" charset="2"/>
-              <a:buChar char=""/>
-            </a:pPr>
-            <a:r>
-              <a:rPr lang="en-US" sz="1600" b="0" strike="noStrike" spc="-1">
-                <a:solidFill>
-                  <a:srgbClr val="404040"/>
-                </a:solidFill>
-                <a:uFill>
-                  <a:solidFill>
-                    <a:srgbClr val="FFFFFF"/>
-                  </a:solidFill>
-                </a:uFill>
-                <a:latin typeface="Trebuchet MS"/>
-              </a:rPr>
-              <a:t>Needed to know type of input to the Nano, output from Pi</a:t>
-            </a:r>
-          </a:p>
-          <a:p>
-            <a:pPr marL="743040" lvl="1" indent="-285480">
-              <a:lnSpc>
-                <a:spcPct val="100000"/>
-              </a:lnSpc>
-              <a:spcBef>
-                <a:spcPts val="1001"/>
-              </a:spcBef>
-              <a:buClr>
-                <a:srgbClr val="90C226"/>
-              </a:buClr>
-              <a:buSzPct val="80000"/>
-              <a:buFont typeface="Wingdings 3" charset="2"/>
-              <a:buChar char=""/>
-            </a:pPr>
-            <a:r>
-              <a:rPr lang="en-US" sz="1600" b="0" strike="noStrike" spc="-1">
-                <a:solidFill>
-                  <a:srgbClr val="404040"/>
-                </a:solidFill>
-                <a:uFill>
-                  <a:solidFill>
-                    <a:srgbClr val="FFFFFF"/>
-                  </a:solidFill>
-                </a:uFill>
-                <a:latin typeface="Trebuchet MS"/>
-              </a:rPr>
-              <a:t>Timing issues between State Composer and the Arduino</a:t>
-            </a:r>
-          </a:p>
-          <a:p>
-            <a:pPr marL="1143000" lvl="2" indent="-228240">
-              <a:lnSpc>
-                <a:spcPct val="100000"/>
-              </a:lnSpc>
-              <a:spcBef>
-                <a:spcPts val="1001"/>
-              </a:spcBef>
-              <a:buClr>
-                <a:srgbClr val="90C226"/>
-              </a:buClr>
-              <a:buSzPct val="80000"/>
-              <a:buFont typeface="Wingdings 3" charset="2"/>
-              <a:buChar char=""/>
-            </a:pPr>
-            <a:r>
-              <a:rPr lang="en-US" sz="1400" b="0" strike="noStrike" spc="-1">
-                <a:solidFill>
-                  <a:srgbClr val="404040"/>
-                </a:solidFill>
-                <a:uFill>
-                  <a:solidFill>
-                    <a:srgbClr val="FFFFFF"/>
-                  </a:solidFill>
-                </a:uFill>
-                <a:latin typeface="Trebuchet MS"/>
-              </a:rPr>
-              <a:t>RGB Colors sporadic</a:t>
-            </a:r>
-          </a:p>
-          <a:p>
-            <a:pPr marL="343080" indent="-342720">
-              <a:lnSpc>
-                <a:spcPct val="100000"/>
-              </a:lnSpc>
-              <a:spcBef>
-                <a:spcPts val="1001"/>
-              </a:spcBef>
-              <a:buClr>
-                <a:srgbClr val="90C226"/>
-              </a:buClr>
-              <a:buSzPct val="80000"/>
-              <a:buFont typeface="Wingdings 3" charset="2"/>
-              <a:buChar char=""/>
-            </a:pPr>
-            <a:r>
-              <a:rPr lang="en-US" sz="1800" b="0" strike="noStrike" spc="-1">
-                <a:solidFill>
-                  <a:srgbClr val="404040"/>
-                </a:solidFill>
-                <a:uFill>
-                  <a:solidFill>
-                    <a:srgbClr val="FFFFFF"/>
-                  </a:solidFill>
-                </a:uFill>
-                <a:latin typeface="Trebuchet MS"/>
-              </a:rPr>
-              <a:t>Serial read efficiency on Arduino Nano</a:t>
-            </a:r>
           </a:p>
         </p:txBody>
       </p:sp>

</xml_diff>

<commit_message>
Added itterations to presentation
</commit_message>
<xml_diff>
--- a/Documents/PresentationSpring/Spring Presentation.pptx
+++ b/Documents/PresentationSpring/Spring Presentation.pptx
@@ -5,12 +5,18 @@
     <p:sldMasterId id="2147483674" r:id="rId1"/>
   </p:sldMasterIdLst>
   <p:notesMasterIdLst>
-    <p:notesMasterId r:id="rId5"/>
+    <p:notesMasterId r:id="rId11"/>
   </p:notesMasterIdLst>
   <p:sldIdLst>
     <p:sldId id="256" r:id="rId2"/>
-    <p:sldId id="257" r:id="rId3"/>
-    <p:sldId id="265" r:id="rId4"/>
+    <p:sldId id="266" r:id="rId3"/>
+    <p:sldId id="267" r:id="rId4"/>
+    <p:sldId id="268" r:id="rId5"/>
+    <p:sldId id="269" r:id="rId6"/>
+    <p:sldId id="270" r:id="rId7"/>
+    <p:sldId id="271" r:id="rId8"/>
+    <p:sldId id="272" r:id="rId9"/>
+    <p:sldId id="265" r:id="rId10"/>
   </p:sldIdLst>
   <p:sldSz cx="12192000" cy="6858000"/>
   <p:notesSz cx="7772400" cy="10058400"/>
@@ -115,6 +121,10 @@
     </p:ext>
   </p:extLst>
 </p:presentation>
+</file>
+
+<file path=ppt/revisionInfo.xml><?xml version="1.0" encoding="utf-8"?>
+<p1510:revInfo xmlns:a="http://schemas.openxmlformats.org/drawingml/2006/main" xmlns:r="http://schemas.openxmlformats.org/officeDocument/2006/relationships" xmlns:p1510="http://schemas.microsoft.com/office/powerpoint/2015/10/main"/>
 </file>
 
 <file path=ppt/notesMasters/notesMaster1.xml><?xml version="1.0" encoding="utf-8"?>
@@ -1173,7 +1183,7 @@
             <a:fld id="{B61BEF0D-F0BB-DE4B-95CE-6DB70DBA9567}" type="datetimeFigureOut">
               <a:rPr lang="en-US" dirty="0"/>
               <a:pPr/>
-              <a:t>5/4/2018</a:t>
+              <a:t>5/5/2018</a:t>
             </a:fld>
             <a:endParaRPr lang="en-US" dirty="0"/>
           </a:p>
@@ -1440,7 +1450,7 @@
                 </a:uFill>
                 <a:latin typeface="Trebuchet MS"/>
               </a:rPr>
-              <a:t>5/4/2018</a:t>
+              <a:t>5/5/2018</a:t>
             </a:fld>
             <a:endParaRPr lang="en-US" sz="900" b="0" strike="noStrike" spc="-1">
               <a:solidFill>
@@ -1814,7 +1824,7 @@
                 </a:uFill>
                 <a:latin typeface="Trebuchet MS"/>
               </a:rPr>
-              <a:t>5/4/2018</a:t>
+              <a:t>5/5/2018</a:t>
             </a:fld>
             <a:endParaRPr lang="en-US" sz="900" b="0" strike="noStrike" spc="-1">
               <a:solidFill>
@@ -2215,7 +2225,7 @@
                 </a:uFill>
                 <a:latin typeface="Trebuchet MS"/>
               </a:rPr>
-              <a:t>5/4/2018</a:t>
+              <a:t>5/5/2018</a:t>
             </a:fld>
             <a:endParaRPr lang="en-US" sz="900" b="0" strike="noStrike" spc="-1">
               <a:solidFill>
@@ -2589,7 +2599,7 @@
                 </a:uFill>
                 <a:latin typeface="Trebuchet MS"/>
               </a:rPr>
-              <a:t>5/4/2018</a:t>
+              <a:t>5/5/2018</a:t>
             </a:fld>
             <a:endParaRPr lang="en-US" sz="900" b="0" strike="noStrike" spc="-1">
               <a:solidFill>
@@ -3042,7 +3052,7 @@
                 </a:uFill>
                 <a:latin typeface="Trebuchet MS"/>
               </a:rPr>
-              <a:t>5/4/2018</a:t>
+              <a:t>5/5/2018</a:t>
             </a:fld>
             <a:endParaRPr lang="en-US" sz="900" b="0" strike="noStrike" spc="-1">
               <a:solidFill>
@@ -3272,7 +3282,7 @@
                 </a:uFill>
                 <a:latin typeface="Trebuchet MS"/>
               </a:rPr>
-              <a:t>5/4/2018</a:t>
+              <a:t>5/5/2018</a:t>
             </a:fld>
             <a:endParaRPr lang="en-US" sz="900" b="0" strike="noStrike" spc="-1">
               <a:solidFill>
@@ -3512,7 +3522,7 @@
                 </a:uFill>
                 <a:latin typeface="Trebuchet MS"/>
               </a:rPr>
-              <a:t>5/4/2018</a:t>
+              <a:t>5/5/2018</a:t>
             </a:fld>
             <a:endParaRPr lang="en-US" sz="900" b="0" strike="noStrike" spc="-1">
               <a:solidFill>
@@ -3748,7 +3758,7 @@
                 </a:uFill>
                 <a:latin typeface="Trebuchet MS"/>
               </a:rPr>
-              <a:t>5/4/2018</a:t>
+              <a:t>5/5/2018</a:t>
             </a:fld>
             <a:endParaRPr lang="en-US" sz="900" b="0" strike="noStrike" spc="-1">
               <a:solidFill>
@@ -4055,7 +4065,7 @@
                 </a:uFill>
                 <a:latin typeface="Trebuchet MS"/>
               </a:rPr>
-              <a:t>5/4/2018</a:t>
+              <a:t>5/5/2018</a:t>
             </a:fld>
             <a:endParaRPr lang="en-US" sz="900" b="0" strike="noStrike" spc="-1">
               <a:solidFill>
@@ -4347,7 +4357,7 @@
                 </a:uFill>
                 <a:latin typeface="Trebuchet MS"/>
               </a:rPr>
-              <a:t>5/4/2018</a:t>
+              <a:t>5/5/2018</a:t>
             </a:fld>
             <a:endParaRPr lang="en-US" sz="900" b="0" strike="noStrike" spc="-1">
               <a:solidFill>
@@ -4781,7 +4791,7 @@
                 </a:uFill>
                 <a:latin typeface="Trebuchet MS"/>
               </a:rPr>
-              <a:t>5/4/2018</a:t>
+              <a:t>5/5/2018</a:t>
             </a:fld>
             <a:endParaRPr lang="en-US" sz="900" b="0" strike="noStrike" spc="-1">
               <a:solidFill>
@@ -4950,7 +4960,7 @@
             <a:fld id="{B61BEF0D-F0BB-DE4B-95CE-6DB70DBA9567}" type="datetimeFigureOut">
               <a:rPr lang="en-US" dirty="0"/>
               <a:pPr/>
-              <a:t>5/4/2018</a:t>
+              <a:t>5/5/2018</a:t>
             </a:fld>
             <a:endParaRPr lang="en-US" dirty="0"/>
           </a:p>
@@ -5061,7 +5071,7 @@
                 </a:uFill>
                 <a:latin typeface="Trebuchet MS"/>
               </a:rPr>
-              <a:t>5/4/2018</a:t>
+              <a:t>5/5/2018</a:t>
             </a:fld>
             <a:endParaRPr lang="en-US" sz="900" b="0" strike="noStrike" spc="-1">
               <a:solidFill>
@@ -5376,7 +5386,7 @@
                 </a:uFill>
                 <a:latin typeface="Trebuchet MS"/>
               </a:rPr>
-              <a:t>5/4/2018</a:t>
+              <a:t>5/5/2018</a:t>
             </a:fld>
             <a:endParaRPr lang="en-US" sz="900" b="0" strike="noStrike" spc="-1">
               <a:solidFill>
@@ -5699,7 +5709,7 @@
                 </a:uFill>
                 <a:latin typeface="Trebuchet MS"/>
               </a:rPr>
-              <a:t>5/4/2018</a:t>
+              <a:t>5/5/2018</a:t>
             </a:fld>
             <a:endParaRPr lang="en-US" sz="900" b="0" strike="noStrike" spc="-1">
               <a:solidFill>
@@ -6502,7 +6512,7 @@
                 </a:uFill>
                 <a:latin typeface="Trebuchet MS"/>
               </a:rPr>
-              <a:t>5/4/2018</a:t>
+              <a:t>5/5/2018</a:t>
             </a:fld>
             <a:endParaRPr lang="en-US" sz="900" b="0" strike="noStrike" spc="-1">
               <a:solidFill>
@@ -7394,7 +7404,13 @@
       </p:grpSpPr>
       <p:sp>
         <p:nvSpPr>
-          <p:cNvPr id="120" name="TextShape 1"/>
+          <p:cNvPr id="2" name="TextShape 1">
+            <a:extLst>
+              <a:ext uri="{FF2B5EF4-FFF2-40B4-BE49-F238E27FC236}">
+                <a16:creationId xmlns:a16="http://schemas.microsoft.com/office/drawing/2014/main" id="{0A8C3C35-0E5C-42B3-973C-58F4F4787219}"/>
+              </a:ext>
+            </a:extLst>
+          </p:cNvPr>
           <p:cNvSpPr txBox="1"/>
           <p:nvPr/>
         </p:nvSpPr>
@@ -7415,25 +7431,36 @@
           <a:bodyPr/>
           <a:lstStyle/>
           <a:p>
+            <a:r>
+              <a:rPr lang="en-US" sz="3600" spc="-1" dirty="0">
+                <a:solidFill>
+                  <a:srgbClr val="90C226"/>
+                </a:solidFill>
+                <a:uFill>
+                  <a:solidFill>
+                    <a:srgbClr val="FFFFFF"/>
+                  </a:solidFill>
+                </a:uFill>
+              </a:rPr>
+              <a:t>Iteration 1</a:t>
+            </a:r>
+            <a:endParaRPr lang="en-US" sz="3600" spc="-1" dirty="0">
+              <a:solidFill>
+                <a:srgbClr val="000000"/>
+              </a:solidFill>
+              <a:uFill>
+                <a:solidFill>
+                  <a:srgbClr val="FFFFFF"/>
+                </a:solidFill>
+              </a:uFill>
+            </a:endParaRPr>
+          </a:p>
+          <a:p>
             <a:pPr>
               <a:lnSpc>
                 <a:spcPct val="100000"/>
               </a:lnSpc>
             </a:pPr>
-            <a:r>
-              <a:rPr lang="en-US" sz="3600" b="0" strike="noStrike" spc="-1" dirty="0">
-                <a:solidFill>
-                  <a:srgbClr val="90C226"/>
-                </a:solidFill>
-                <a:uFill>
-                  <a:solidFill>
-                    <a:srgbClr val="FFFFFF"/>
-                  </a:solidFill>
-                </a:uFill>
-                <a:latin typeface="Trebuchet MS"/>
-              </a:rPr>
-              <a:t>Introduction</a:t>
-            </a:r>
             <a:endParaRPr lang="en-US" sz="3600" b="0" strike="noStrike" spc="-1" dirty="0">
               <a:solidFill>
                 <a:srgbClr val="000000"/>
@@ -7450,13 +7477,19 @@
       </p:sp>
       <p:sp>
         <p:nvSpPr>
-          <p:cNvPr id="121" name="TextShape 2"/>
+          <p:cNvPr id="3" name="TextShape 2">
+            <a:extLst>
+              <a:ext uri="{FF2B5EF4-FFF2-40B4-BE49-F238E27FC236}">
+                <a16:creationId xmlns:a16="http://schemas.microsoft.com/office/drawing/2014/main" id="{3480FF70-4EE5-43BF-ACA1-B0480C1EB475}"/>
+              </a:ext>
+            </a:extLst>
+          </p:cNvPr>
           <p:cNvSpPr txBox="1"/>
           <p:nvPr/>
         </p:nvSpPr>
         <p:spPr>
           <a:xfrm>
-            <a:off x="677160" y="1934867"/>
+            <a:off x="227981" y="1694235"/>
             <a:ext cx="9798335" cy="3317962"/>
           </a:xfrm>
           <a:prstGeom prst="rect">
@@ -7488,7 +7521,7 @@
               <a:buChar char=""/>
             </a:pPr>
             <a:r>
-              <a:rPr lang="en-US" sz="1800" b="0" strike="noStrike" spc="-1" dirty="0">
+              <a:rPr lang="en-US" spc="-1" dirty="0">
                 <a:solidFill>
                   <a:srgbClr val="404040"/>
                 </a:solidFill>
@@ -7497,10 +7530,20 @@
                     <a:srgbClr val="FFFFFF"/>
                   </a:solidFill>
                 </a:uFill>
-                <a:latin typeface="Trebuchet MS"/>
               </a:rPr>
-              <a:t>Expo Pitch</a:t>
-            </a:r>
+              <a:t>Iteration 0 accomplishes rough connectivity between the RGB strips and the microcontroller system. This means the Master controller can provide input to the LED controllers to manipulate trivial options like color and brightness. This iteration is only expected to take a maximum of 2 weeks, and may take closer to the end of those two weeks. This is the initial "get the ball rolling" iteration. It is expected there may be some complications	 getting used to the code environment, and getting the hardware up and running.</a:t>
+            </a:r>
+            <a:endParaRPr lang="en-US" sz="1800" b="0" strike="noStrike" spc="-1" dirty="0">
+              <a:solidFill>
+                <a:srgbClr val="404040"/>
+              </a:solidFill>
+              <a:uFill>
+                <a:solidFill>
+                  <a:srgbClr val="FFFFFF"/>
+                </a:solidFill>
+              </a:uFill>
+              <a:latin typeface="Trebuchet MS"/>
+            </a:endParaRPr>
           </a:p>
           <a:p>
             <a:pPr marL="343080" indent="-342720">
@@ -7529,6 +7572,141 @@
               <a:latin typeface="Trebuchet MS"/>
             </a:endParaRPr>
           </a:p>
+        </p:txBody>
+      </p:sp>
+    </p:spTree>
+    <p:extLst>
+      <p:ext uri="{BB962C8B-B14F-4D97-AF65-F5344CB8AC3E}">
+        <p14:creationId xmlns:p14="http://schemas.microsoft.com/office/powerpoint/2010/main" val="3885252661"/>
+      </p:ext>
+    </p:extLst>
+  </p:cSld>
+  <p:clrMapOvr>
+    <a:masterClrMapping/>
+  </p:clrMapOvr>
+</p:sld>
+</file>
+
+<file path=ppt/slides/slide3.xml><?xml version="1.0" encoding="utf-8"?>
+<p:sld xmlns:a="http://schemas.openxmlformats.org/drawingml/2006/main" xmlns:r="http://schemas.openxmlformats.org/officeDocument/2006/relationships" xmlns:p="http://schemas.openxmlformats.org/presentationml/2006/main">
+  <p:cSld>
+    <p:spTree>
+      <p:nvGrpSpPr>
+        <p:cNvPr id="1" name=""/>
+        <p:cNvGrpSpPr/>
+        <p:nvPr/>
+      </p:nvGrpSpPr>
+      <p:grpSpPr>
+        <a:xfrm>
+          <a:off x="0" y="0"/>
+          <a:ext cx="0" cy="0"/>
+          <a:chOff x="0" y="0"/>
+          <a:chExt cx="0" cy="0"/>
+        </a:xfrm>
+      </p:grpSpPr>
+      <p:sp>
+        <p:nvSpPr>
+          <p:cNvPr id="2" name="TextShape 1">
+            <a:extLst>
+              <a:ext uri="{FF2B5EF4-FFF2-40B4-BE49-F238E27FC236}">
+                <a16:creationId xmlns:a16="http://schemas.microsoft.com/office/drawing/2014/main" id="{4E2A7A50-A034-4DF5-9E5B-CB3BC92306F0}"/>
+              </a:ext>
+            </a:extLst>
+          </p:cNvPr>
+          <p:cNvSpPr txBox="1"/>
+          <p:nvPr/>
+        </p:nvSpPr>
+        <p:spPr>
+          <a:xfrm>
+            <a:off x="677160" y="609480"/>
+            <a:ext cx="8596440" cy="1320480"/>
+          </a:xfrm>
+          <a:prstGeom prst="rect">
+            <a:avLst/>
+          </a:prstGeom>
+          <a:noFill/>
+          <a:ln>
+            <a:noFill/>
+          </a:ln>
+        </p:spPr>
+        <p:txBody>
+          <a:bodyPr/>
+          <a:lstStyle/>
+          <a:p>
+            <a:r>
+              <a:rPr lang="en-US" sz="3600" spc="-1" dirty="0">
+                <a:solidFill>
+                  <a:srgbClr val="90C226"/>
+                </a:solidFill>
+                <a:uFill>
+                  <a:solidFill>
+                    <a:srgbClr val="FFFFFF"/>
+                  </a:solidFill>
+                </a:uFill>
+              </a:rPr>
+              <a:t>Iteration 2</a:t>
+            </a:r>
+            <a:endParaRPr lang="en-US" sz="3600" spc="-1" dirty="0">
+              <a:solidFill>
+                <a:srgbClr val="000000"/>
+              </a:solidFill>
+              <a:uFill>
+                <a:solidFill>
+                  <a:srgbClr val="FFFFFF"/>
+                </a:solidFill>
+              </a:uFill>
+            </a:endParaRPr>
+          </a:p>
+          <a:p>
+            <a:pPr>
+              <a:lnSpc>
+                <a:spcPct val="100000"/>
+              </a:lnSpc>
+            </a:pPr>
+            <a:endParaRPr lang="en-US" sz="3600" b="0" strike="noStrike" spc="-1" dirty="0">
+              <a:solidFill>
+                <a:srgbClr val="000000"/>
+              </a:solidFill>
+              <a:uFill>
+                <a:solidFill>
+                  <a:srgbClr val="FFFFFF"/>
+                </a:solidFill>
+              </a:uFill>
+              <a:latin typeface="Trebuchet MS"/>
+            </a:endParaRPr>
+          </a:p>
+        </p:txBody>
+      </p:sp>
+      <p:sp>
+        <p:nvSpPr>
+          <p:cNvPr id="3" name="TextShape 2">
+            <a:extLst>
+              <a:ext uri="{FF2B5EF4-FFF2-40B4-BE49-F238E27FC236}">
+                <a16:creationId xmlns:a16="http://schemas.microsoft.com/office/drawing/2014/main" id="{1B85F56A-F0C9-4913-97A0-D09BD02A506A}"/>
+              </a:ext>
+            </a:extLst>
+          </p:cNvPr>
+          <p:cNvSpPr txBox="1"/>
+          <p:nvPr/>
+        </p:nvSpPr>
+        <p:spPr>
+          <a:xfrm>
+            <a:off x="227981" y="1929960"/>
+            <a:ext cx="9798335" cy="3317962"/>
+          </a:xfrm>
+          <a:prstGeom prst="rect">
+            <a:avLst/>
+          </a:prstGeom>
+          <a:noFill/>
+          <a:ln>
+            <a:noFill/>
+          </a:ln>
+        </p:spPr>
+        <p:txBody>
+          <a:bodyPr>
+            <a:normAutofit/>
+          </a:bodyPr>
+          <a:lstStyle/>
           <a:p>
             <a:pPr marL="343080" indent="-342720">
               <a:lnSpc>
@@ -7554,25 +7732,10 @@
                     <a:srgbClr val="FFFFFF"/>
                   </a:solidFill>
                 </a:uFill>
-                <a:latin typeface="Trebuchet MS"/>
               </a:rPr>
-              <a:t>Spotlight Features</a:t>
-            </a:r>
-          </a:p>
-          <a:p>
-            <a:pPr marL="360">
-              <a:lnSpc>
-                <a:spcPct val="120000"/>
-              </a:lnSpc>
-              <a:spcBef>
-                <a:spcPts val="1001"/>
-              </a:spcBef>
-              <a:buClr>
-                <a:srgbClr val="90C226"/>
-              </a:buClr>
-              <a:buSzPct val="80000"/>
-            </a:pPr>
-            <a:endParaRPr lang="en-US" spc="-1" dirty="0">
+              <a:t>Iteration 2 builds on Iteration 1 by making the LED controller look for values and configurations on the Master controller. These are scheduled statically. This is more of a testing iteration to see what the capabilities of communication are between the two controllers. This time will likely decrease. However, it still leaves time should any new issues arise in the details of the design.</a:t>
+            </a:r>
+            <a:endParaRPr lang="en-US" sz="1800" b="0" strike="noStrike" spc="-1" dirty="0">
               <a:solidFill>
                 <a:srgbClr val="404040"/>
               </a:solidFill>
@@ -7584,6 +7747,128 @@
               <a:latin typeface="Trebuchet MS"/>
             </a:endParaRPr>
           </a:p>
+        </p:txBody>
+      </p:sp>
+    </p:spTree>
+    <p:extLst>
+      <p:ext uri="{BB962C8B-B14F-4D97-AF65-F5344CB8AC3E}">
+        <p14:creationId xmlns:p14="http://schemas.microsoft.com/office/powerpoint/2010/main" val="2504338932"/>
+      </p:ext>
+    </p:extLst>
+  </p:cSld>
+  <p:clrMapOvr>
+    <a:masterClrMapping/>
+  </p:clrMapOvr>
+</p:sld>
+</file>
+
+<file path=ppt/slides/slide4.xml><?xml version="1.0" encoding="utf-8"?>
+<p:sld xmlns:a="http://schemas.openxmlformats.org/drawingml/2006/main" xmlns:r="http://schemas.openxmlformats.org/officeDocument/2006/relationships" xmlns:p="http://schemas.openxmlformats.org/presentationml/2006/main">
+  <p:cSld>
+    <p:spTree>
+      <p:nvGrpSpPr>
+        <p:cNvPr id="1" name=""/>
+        <p:cNvGrpSpPr/>
+        <p:nvPr/>
+      </p:nvGrpSpPr>
+      <p:grpSpPr>
+        <a:xfrm>
+          <a:off x="0" y="0"/>
+          <a:ext cx="0" cy="0"/>
+          <a:chOff x="0" y="0"/>
+          <a:chExt cx="0" cy="0"/>
+        </a:xfrm>
+      </p:grpSpPr>
+      <p:sp>
+        <p:nvSpPr>
+          <p:cNvPr id="2" name="TextShape 1">
+            <a:extLst>
+              <a:ext uri="{FF2B5EF4-FFF2-40B4-BE49-F238E27FC236}">
+                <a16:creationId xmlns:a16="http://schemas.microsoft.com/office/drawing/2014/main" id="{7F78C178-3A9B-46C7-8A22-243713B8DAD5}"/>
+              </a:ext>
+            </a:extLst>
+          </p:cNvPr>
+          <p:cNvSpPr txBox="1"/>
+          <p:nvPr/>
+        </p:nvSpPr>
+        <p:spPr>
+          <a:xfrm>
+            <a:off x="677160" y="609480"/>
+            <a:ext cx="8596440" cy="1320480"/>
+          </a:xfrm>
+          <a:prstGeom prst="rect">
+            <a:avLst/>
+          </a:prstGeom>
+          <a:noFill/>
+          <a:ln>
+            <a:noFill/>
+          </a:ln>
+        </p:spPr>
+        <p:txBody>
+          <a:bodyPr/>
+          <a:lstStyle/>
+          <a:p>
+            <a:pPr>
+              <a:lnSpc>
+                <a:spcPct val="100000"/>
+              </a:lnSpc>
+            </a:pPr>
+            <a:r>
+              <a:rPr lang="en-US" sz="3600" spc="-1" dirty="0">
+                <a:solidFill>
+                  <a:srgbClr val="90C226"/>
+                </a:solidFill>
+                <a:uFill>
+                  <a:solidFill>
+                    <a:srgbClr val="FFFFFF"/>
+                  </a:solidFill>
+                </a:uFill>
+              </a:rPr>
+              <a:t>Iteration 3</a:t>
+            </a:r>
+            <a:endParaRPr lang="en-US" sz="3600" spc="-1" dirty="0">
+              <a:solidFill>
+                <a:srgbClr val="000000"/>
+              </a:solidFill>
+              <a:uFill>
+                <a:solidFill>
+                  <a:srgbClr val="FFFFFF"/>
+                </a:solidFill>
+              </a:uFill>
+            </a:endParaRPr>
+          </a:p>
+        </p:txBody>
+      </p:sp>
+      <p:sp>
+        <p:nvSpPr>
+          <p:cNvPr id="3" name="TextShape 2">
+            <a:extLst>
+              <a:ext uri="{FF2B5EF4-FFF2-40B4-BE49-F238E27FC236}">
+                <a16:creationId xmlns:a16="http://schemas.microsoft.com/office/drawing/2014/main" id="{BC7AB731-BE28-4D66-A49F-83A0465693CF}"/>
+              </a:ext>
+            </a:extLst>
+          </p:cNvPr>
+          <p:cNvSpPr txBox="1"/>
+          <p:nvPr/>
+        </p:nvSpPr>
+        <p:spPr>
+          <a:xfrm>
+            <a:off x="76212" y="1662151"/>
+            <a:ext cx="9798335" cy="3317962"/>
+          </a:xfrm>
+          <a:prstGeom prst="rect">
+            <a:avLst/>
+          </a:prstGeom>
+          <a:noFill/>
+          <a:ln>
+            <a:noFill/>
+          </a:ln>
+        </p:spPr>
+        <p:txBody>
+          <a:bodyPr>
+            <a:normAutofit/>
+          </a:bodyPr>
+          <a:lstStyle/>
           <a:p>
             <a:pPr marL="343080" indent="-342720">
               <a:lnSpc>
@@ -7600,7 +7885,7 @@
               <a:buChar char=""/>
             </a:pPr>
             <a:r>
-              <a:rPr lang="en-US" spc="-1">
+              <a:rPr lang="en-US" spc="-1" dirty="0">
                 <a:solidFill>
                   <a:srgbClr val="404040"/>
                 </a:solidFill>
@@ -7609,9 +7894,8 @@
                     <a:srgbClr val="FFFFFF"/>
                   </a:solidFill>
                 </a:uFill>
-                <a:latin typeface="Trebuchet MS"/>
               </a:rPr>
-              <a:t>Requirements Met</a:t>
+              <a:t>Iteration 3's largest feature is the scripting of the basic LED controls. A user may run a text based script to insert values into the control	service. This updates the LEDs quickly, but may not be user friendly. This may also be a shortened iteration interval. The passing of data is completed, and a script is now taking over for manual updates. This script may also be the base for which future command line interfaces to the LEDs are made.</a:t>
             </a:r>
             <a:endParaRPr lang="en-US" sz="1800" b="0" strike="noStrike" spc="-1" dirty="0">
               <a:solidFill>
@@ -7628,41 +7912,680 @@
         </p:txBody>
       </p:sp>
     </p:spTree>
+    <p:extLst>
+      <p:ext uri="{BB962C8B-B14F-4D97-AF65-F5344CB8AC3E}">
+        <p14:creationId xmlns:p14="http://schemas.microsoft.com/office/powerpoint/2010/main" val="897414064"/>
+      </p:ext>
+    </p:extLst>
   </p:cSld>
   <p:clrMapOvr>
     <a:masterClrMapping/>
   </p:clrMapOvr>
-  <p:timing>
-    <p:tnLst>
-      <p:par>
-        <p:cTn id="1" dur="indefinite" restart="never" nodeType="tmRoot">
-          <p:childTnLst>
-            <p:seq>
-              <p:cTn id="2" nodeType="mainSeq"/>
-              <p:prevCondLst>
-                <p:cond evt="onPrev" delay="0">
-                  <p:tgtEl>
-                    <p:sldTgt/>
-                  </p:tgtEl>
-                </p:cond>
-              </p:prevCondLst>
-              <p:nextCondLst>
-                <p:cond evt="onNext" delay="0">
-                  <p:tgtEl>
-                    <p:sldTgt/>
-                  </p:tgtEl>
-                </p:cond>
-              </p:nextCondLst>
-            </p:seq>
-          </p:childTnLst>
-        </p:cTn>
-      </p:par>
-    </p:tnLst>
-  </p:timing>
 </p:sld>
 </file>
 
-<file path=ppt/slides/slide3.xml><?xml version="1.0" encoding="utf-8"?>
+<file path=ppt/slides/slide5.xml><?xml version="1.0" encoding="utf-8"?>
+<p:sld xmlns:a="http://schemas.openxmlformats.org/drawingml/2006/main" xmlns:r="http://schemas.openxmlformats.org/officeDocument/2006/relationships" xmlns:p="http://schemas.openxmlformats.org/presentationml/2006/main">
+  <p:cSld>
+    <p:spTree>
+      <p:nvGrpSpPr>
+        <p:cNvPr id="1" name=""/>
+        <p:cNvGrpSpPr/>
+        <p:nvPr/>
+      </p:nvGrpSpPr>
+      <p:grpSpPr>
+        <a:xfrm>
+          <a:off x="0" y="0"/>
+          <a:ext cx="0" cy="0"/>
+          <a:chOff x="0" y="0"/>
+          <a:chExt cx="0" cy="0"/>
+        </a:xfrm>
+      </p:grpSpPr>
+      <p:sp>
+        <p:nvSpPr>
+          <p:cNvPr id="2" name="TextShape 1">
+            <a:extLst>
+              <a:ext uri="{FF2B5EF4-FFF2-40B4-BE49-F238E27FC236}">
+                <a16:creationId xmlns:a16="http://schemas.microsoft.com/office/drawing/2014/main" id="{EB18B3AB-C094-4FE2-99BD-9E92AD5AE6B6}"/>
+              </a:ext>
+            </a:extLst>
+          </p:cNvPr>
+          <p:cNvSpPr txBox="1"/>
+          <p:nvPr/>
+        </p:nvSpPr>
+        <p:spPr>
+          <a:xfrm>
+            <a:off x="677160" y="609480"/>
+            <a:ext cx="8596440" cy="1320480"/>
+          </a:xfrm>
+          <a:prstGeom prst="rect">
+            <a:avLst/>
+          </a:prstGeom>
+          <a:noFill/>
+          <a:ln>
+            <a:noFill/>
+          </a:ln>
+        </p:spPr>
+        <p:txBody>
+          <a:bodyPr/>
+          <a:lstStyle/>
+          <a:p>
+            <a:pPr>
+              <a:lnSpc>
+                <a:spcPct val="100000"/>
+              </a:lnSpc>
+            </a:pPr>
+            <a:r>
+              <a:rPr lang="en-US" sz="3600" spc="-1" dirty="0">
+                <a:solidFill>
+                  <a:srgbClr val="90C226"/>
+                </a:solidFill>
+                <a:uFill>
+                  <a:solidFill>
+                    <a:srgbClr val="FFFFFF"/>
+                  </a:solidFill>
+                </a:uFill>
+              </a:rPr>
+              <a:t>Iteration 4</a:t>
+            </a:r>
+            <a:endParaRPr lang="en-US" sz="3600" spc="-1" dirty="0">
+              <a:solidFill>
+                <a:srgbClr val="000000"/>
+              </a:solidFill>
+              <a:uFill>
+                <a:solidFill>
+                  <a:srgbClr val="FFFFFF"/>
+                </a:solidFill>
+              </a:uFill>
+            </a:endParaRPr>
+          </a:p>
+        </p:txBody>
+      </p:sp>
+      <p:sp>
+        <p:nvSpPr>
+          <p:cNvPr id="3" name="TextShape 2">
+            <a:extLst>
+              <a:ext uri="{FF2B5EF4-FFF2-40B4-BE49-F238E27FC236}">
+                <a16:creationId xmlns:a16="http://schemas.microsoft.com/office/drawing/2014/main" id="{5EF182C4-8C06-4D2E-9FE2-8BC7373EF65A}"/>
+              </a:ext>
+            </a:extLst>
+          </p:cNvPr>
+          <p:cNvSpPr txBox="1"/>
+          <p:nvPr/>
+        </p:nvSpPr>
+        <p:spPr>
+          <a:xfrm>
+            <a:off x="76212" y="1593076"/>
+            <a:ext cx="9798335" cy="3317962"/>
+          </a:xfrm>
+          <a:prstGeom prst="rect">
+            <a:avLst/>
+          </a:prstGeom>
+          <a:noFill/>
+          <a:ln>
+            <a:noFill/>
+          </a:ln>
+        </p:spPr>
+        <p:txBody>
+          <a:bodyPr>
+            <a:normAutofit/>
+          </a:bodyPr>
+          <a:lstStyle/>
+          <a:p>
+            <a:pPr marL="343080" indent="-342720">
+              <a:lnSpc>
+                <a:spcPct val="120000"/>
+              </a:lnSpc>
+              <a:spcBef>
+                <a:spcPts val="1001"/>
+              </a:spcBef>
+              <a:buClr>
+                <a:srgbClr val="90C226"/>
+              </a:buClr>
+              <a:buSzPct val="80000"/>
+              <a:buFont typeface="Wingdings 3" charset="2"/>
+              <a:buChar char=""/>
+            </a:pPr>
+            <a:r>
+              <a:rPr lang="en-US" spc="-1" dirty="0">
+                <a:solidFill>
+                  <a:srgbClr val="404040"/>
+                </a:solidFill>
+                <a:uFill>
+                  <a:solidFill>
+                    <a:srgbClr val="FFFFFF"/>
+                  </a:solidFill>
+                </a:uFill>
+              </a:rPr>
+              <a:t>This iteration sees the first basic functionality of scheduling the LED timings. Currently, the requirements state the iteration includes daily or weekly changes, but could also include hourly start timings for a specific LED state. Seeing as this iteration requires the implementation of a clock, and potentially multiple schedules running, this iteration could take the entire two weeks of the interval.</a:t>
+            </a:r>
+            <a:endParaRPr lang="en-US" sz="1800" b="0" strike="noStrike" spc="-1" dirty="0">
+              <a:solidFill>
+                <a:srgbClr val="404040"/>
+              </a:solidFill>
+              <a:uFill>
+                <a:solidFill>
+                  <a:srgbClr val="FFFFFF"/>
+                </a:solidFill>
+              </a:uFill>
+              <a:latin typeface="Trebuchet MS"/>
+            </a:endParaRPr>
+          </a:p>
+        </p:txBody>
+      </p:sp>
+    </p:spTree>
+    <p:extLst>
+      <p:ext uri="{BB962C8B-B14F-4D97-AF65-F5344CB8AC3E}">
+        <p14:creationId xmlns:p14="http://schemas.microsoft.com/office/powerpoint/2010/main" val="1347484226"/>
+      </p:ext>
+    </p:extLst>
+  </p:cSld>
+  <p:clrMapOvr>
+    <a:masterClrMapping/>
+  </p:clrMapOvr>
+</p:sld>
+</file>
+
+<file path=ppt/slides/slide6.xml><?xml version="1.0" encoding="utf-8"?>
+<p:sld xmlns:a="http://schemas.openxmlformats.org/drawingml/2006/main" xmlns:r="http://schemas.openxmlformats.org/officeDocument/2006/relationships" xmlns:p="http://schemas.openxmlformats.org/presentationml/2006/main">
+  <p:cSld>
+    <p:spTree>
+      <p:nvGrpSpPr>
+        <p:cNvPr id="1" name=""/>
+        <p:cNvGrpSpPr/>
+        <p:nvPr/>
+      </p:nvGrpSpPr>
+      <p:grpSpPr>
+        <a:xfrm>
+          <a:off x="0" y="0"/>
+          <a:ext cx="0" cy="0"/>
+          <a:chOff x="0" y="0"/>
+          <a:chExt cx="0" cy="0"/>
+        </a:xfrm>
+      </p:grpSpPr>
+      <p:sp>
+        <p:nvSpPr>
+          <p:cNvPr id="2" name="TextShape 1">
+            <a:extLst>
+              <a:ext uri="{FF2B5EF4-FFF2-40B4-BE49-F238E27FC236}">
+                <a16:creationId xmlns:a16="http://schemas.microsoft.com/office/drawing/2014/main" id="{C656AE53-93CC-45F3-8FD1-2082CBBDA2AC}"/>
+              </a:ext>
+            </a:extLst>
+          </p:cNvPr>
+          <p:cNvSpPr txBox="1"/>
+          <p:nvPr/>
+        </p:nvSpPr>
+        <p:spPr>
+          <a:xfrm>
+            <a:off x="677160" y="609480"/>
+            <a:ext cx="8596440" cy="1320480"/>
+          </a:xfrm>
+          <a:prstGeom prst="rect">
+            <a:avLst/>
+          </a:prstGeom>
+          <a:noFill/>
+          <a:ln>
+            <a:noFill/>
+          </a:ln>
+        </p:spPr>
+        <p:txBody>
+          <a:bodyPr/>
+          <a:lstStyle/>
+          <a:p>
+            <a:r>
+              <a:rPr lang="en-US" sz="3600" spc="-1" dirty="0">
+                <a:solidFill>
+                  <a:srgbClr val="90C226"/>
+                </a:solidFill>
+                <a:uFill>
+                  <a:solidFill>
+                    <a:srgbClr val="FFFFFF"/>
+                  </a:solidFill>
+                </a:uFill>
+              </a:rPr>
+              <a:t>Iteration 5</a:t>
+            </a:r>
+            <a:endParaRPr lang="en-US" sz="3600" spc="-1" dirty="0">
+              <a:solidFill>
+                <a:srgbClr val="000000"/>
+              </a:solidFill>
+              <a:uFill>
+                <a:solidFill>
+                  <a:srgbClr val="FFFFFF"/>
+                </a:solidFill>
+              </a:uFill>
+            </a:endParaRPr>
+          </a:p>
+          <a:p>
+            <a:pPr>
+              <a:lnSpc>
+                <a:spcPct val="100000"/>
+              </a:lnSpc>
+            </a:pPr>
+            <a:endParaRPr lang="en-US" sz="3600" b="0" strike="noStrike" spc="-1" dirty="0">
+              <a:solidFill>
+                <a:srgbClr val="000000"/>
+              </a:solidFill>
+              <a:uFill>
+                <a:solidFill>
+                  <a:srgbClr val="FFFFFF"/>
+                </a:solidFill>
+              </a:uFill>
+              <a:latin typeface="Trebuchet MS"/>
+            </a:endParaRPr>
+          </a:p>
+        </p:txBody>
+      </p:sp>
+      <p:sp>
+        <p:nvSpPr>
+          <p:cNvPr id="3" name="TextShape 2">
+            <a:extLst>
+              <a:ext uri="{FF2B5EF4-FFF2-40B4-BE49-F238E27FC236}">
+                <a16:creationId xmlns:a16="http://schemas.microsoft.com/office/drawing/2014/main" id="{37502144-BC89-4246-A5B2-CACB96509EA9}"/>
+              </a:ext>
+            </a:extLst>
+          </p:cNvPr>
+          <p:cNvSpPr txBox="1"/>
+          <p:nvPr/>
+        </p:nvSpPr>
+        <p:spPr>
+          <a:xfrm>
+            <a:off x="76212" y="1549856"/>
+            <a:ext cx="9798335" cy="3317962"/>
+          </a:xfrm>
+          <a:prstGeom prst="rect">
+            <a:avLst/>
+          </a:prstGeom>
+          <a:noFill/>
+          <a:ln>
+            <a:noFill/>
+          </a:ln>
+        </p:spPr>
+        <p:txBody>
+          <a:bodyPr>
+            <a:normAutofit/>
+          </a:bodyPr>
+          <a:lstStyle/>
+          <a:p>
+            <a:pPr marL="343080" indent="-342720">
+              <a:lnSpc>
+                <a:spcPct val="120000"/>
+              </a:lnSpc>
+              <a:spcBef>
+                <a:spcPts val="1001"/>
+              </a:spcBef>
+              <a:buClr>
+                <a:srgbClr val="90C226"/>
+              </a:buClr>
+              <a:buSzPct val="80000"/>
+              <a:buFont typeface="Wingdings 3" charset="2"/>
+              <a:buChar char=""/>
+            </a:pPr>
+            <a:r>
+              <a:rPr lang="en-US" spc="-1" dirty="0">
+                <a:solidFill>
+                  <a:srgbClr val="404040"/>
+                </a:solidFill>
+                <a:uFill>
+                  <a:solidFill>
+                    <a:srgbClr val="FFFFFF"/>
+                  </a:solidFill>
+                </a:uFill>
+              </a:rPr>
+              <a:t>Adding the largest functionality yet, Iteration 5 includes the implementation of LED zoning. Each zone has its own state and schedule. This iteration should almost certainly take the entire two week interval. This is due to the increased coding of the internal state housed by the master controller, which keeps a complete "image" of all zones, their specific LEDs, and schedules</a:t>
+            </a:r>
+            <a:endParaRPr lang="en-US" sz="1800" b="0" strike="noStrike" spc="-1" dirty="0">
+              <a:solidFill>
+                <a:srgbClr val="404040"/>
+              </a:solidFill>
+              <a:uFill>
+                <a:solidFill>
+                  <a:srgbClr val="FFFFFF"/>
+                </a:solidFill>
+              </a:uFill>
+              <a:latin typeface="Trebuchet MS"/>
+            </a:endParaRPr>
+          </a:p>
+        </p:txBody>
+      </p:sp>
+    </p:spTree>
+    <p:extLst>
+      <p:ext uri="{BB962C8B-B14F-4D97-AF65-F5344CB8AC3E}">
+        <p14:creationId xmlns:p14="http://schemas.microsoft.com/office/powerpoint/2010/main" val="4145978487"/>
+      </p:ext>
+    </p:extLst>
+  </p:cSld>
+  <p:clrMapOvr>
+    <a:masterClrMapping/>
+  </p:clrMapOvr>
+</p:sld>
+</file>
+
+<file path=ppt/slides/slide7.xml><?xml version="1.0" encoding="utf-8"?>
+<p:sld xmlns:a="http://schemas.openxmlformats.org/drawingml/2006/main" xmlns:r="http://schemas.openxmlformats.org/officeDocument/2006/relationships" xmlns:p="http://schemas.openxmlformats.org/presentationml/2006/main">
+  <p:cSld>
+    <p:spTree>
+      <p:nvGrpSpPr>
+        <p:cNvPr id="1" name=""/>
+        <p:cNvGrpSpPr/>
+        <p:nvPr/>
+      </p:nvGrpSpPr>
+      <p:grpSpPr>
+        <a:xfrm>
+          <a:off x="0" y="0"/>
+          <a:ext cx="0" cy="0"/>
+          <a:chOff x="0" y="0"/>
+          <a:chExt cx="0" cy="0"/>
+        </a:xfrm>
+      </p:grpSpPr>
+      <p:sp>
+        <p:nvSpPr>
+          <p:cNvPr id="2" name="TextShape 1">
+            <a:extLst>
+              <a:ext uri="{FF2B5EF4-FFF2-40B4-BE49-F238E27FC236}">
+                <a16:creationId xmlns:a16="http://schemas.microsoft.com/office/drawing/2014/main" id="{2C2F1855-54D8-40B7-B690-D56A019F0AC1}"/>
+              </a:ext>
+            </a:extLst>
+          </p:cNvPr>
+          <p:cNvSpPr txBox="1"/>
+          <p:nvPr/>
+        </p:nvSpPr>
+        <p:spPr>
+          <a:xfrm>
+            <a:off x="677160" y="609480"/>
+            <a:ext cx="8596440" cy="1320480"/>
+          </a:xfrm>
+          <a:prstGeom prst="rect">
+            <a:avLst/>
+          </a:prstGeom>
+          <a:noFill/>
+          <a:ln>
+            <a:noFill/>
+          </a:ln>
+        </p:spPr>
+        <p:txBody>
+          <a:bodyPr/>
+          <a:lstStyle/>
+          <a:p>
+            <a:pPr>
+              <a:lnSpc>
+                <a:spcPct val="100000"/>
+              </a:lnSpc>
+            </a:pPr>
+            <a:r>
+              <a:rPr lang="en-US" sz="3600" spc="-1" dirty="0">
+                <a:solidFill>
+                  <a:srgbClr val="90C226"/>
+                </a:solidFill>
+                <a:uFill>
+                  <a:solidFill>
+                    <a:srgbClr val="FFFFFF"/>
+                  </a:solidFill>
+                </a:uFill>
+              </a:rPr>
+              <a:t>Iteration 6</a:t>
+            </a:r>
+            <a:endParaRPr lang="en-US" sz="3600" spc="-1" dirty="0">
+              <a:solidFill>
+                <a:srgbClr val="000000"/>
+              </a:solidFill>
+              <a:uFill>
+                <a:solidFill>
+                  <a:srgbClr val="FFFFFF"/>
+                </a:solidFill>
+              </a:uFill>
+            </a:endParaRPr>
+          </a:p>
+        </p:txBody>
+      </p:sp>
+      <p:sp>
+        <p:nvSpPr>
+          <p:cNvPr id="3" name="TextShape 2">
+            <a:extLst>
+              <a:ext uri="{FF2B5EF4-FFF2-40B4-BE49-F238E27FC236}">
+                <a16:creationId xmlns:a16="http://schemas.microsoft.com/office/drawing/2014/main" id="{643A58B0-E1ED-4890-8E45-7C00D9EE10CA}"/>
+              </a:ext>
+            </a:extLst>
+          </p:cNvPr>
+          <p:cNvSpPr txBox="1"/>
+          <p:nvPr/>
+        </p:nvSpPr>
+        <p:spPr>
+          <a:xfrm>
+            <a:off x="76212" y="1565898"/>
+            <a:ext cx="9798335" cy="3317962"/>
+          </a:xfrm>
+          <a:prstGeom prst="rect">
+            <a:avLst/>
+          </a:prstGeom>
+          <a:noFill/>
+          <a:ln>
+            <a:noFill/>
+          </a:ln>
+        </p:spPr>
+        <p:txBody>
+          <a:bodyPr>
+            <a:normAutofit/>
+          </a:bodyPr>
+          <a:lstStyle/>
+          <a:p>
+            <a:pPr marL="343080" indent="-342720">
+              <a:lnSpc>
+                <a:spcPct val="120000"/>
+              </a:lnSpc>
+              <a:spcBef>
+                <a:spcPts val="1001"/>
+              </a:spcBef>
+              <a:buClr>
+                <a:srgbClr val="90C226"/>
+              </a:buClr>
+              <a:buSzPct val="80000"/>
+              <a:buFont typeface="Wingdings 3" charset="2"/>
+              <a:buChar char=""/>
+            </a:pPr>
+            <a:r>
+              <a:rPr lang="en-US" spc="-1" dirty="0">
+                <a:solidFill>
+                  <a:srgbClr val="404040"/>
+                </a:solidFill>
+                <a:uFill>
+                  <a:solidFill>
+                    <a:srgbClr val="FFFFFF"/>
+                  </a:solidFill>
+                </a:uFill>
+              </a:rPr>
+              <a:t>	Further building upon the previous iteration, Iteration 5 increases the amount of LEDs that can be driven, and the amount of control zones. This provides	more precise control, and more options for future customization. This iteration is not expected to take the full two allotted weeks. Spending less time at this stage gives wiggle room to the final iteration.</a:t>
+            </a:r>
+            <a:endParaRPr lang="en-US" sz="1800" b="0" strike="noStrike" spc="-1" dirty="0">
+              <a:solidFill>
+                <a:srgbClr val="404040"/>
+              </a:solidFill>
+              <a:uFill>
+                <a:solidFill>
+                  <a:srgbClr val="FFFFFF"/>
+                </a:solidFill>
+              </a:uFill>
+              <a:latin typeface="Trebuchet MS"/>
+            </a:endParaRPr>
+          </a:p>
+        </p:txBody>
+      </p:sp>
+    </p:spTree>
+    <p:extLst>
+      <p:ext uri="{BB962C8B-B14F-4D97-AF65-F5344CB8AC3E}">
+        <p14:creationId xmlns:p14="http://schemas.microsoft.com/office/powerpoint/2010/main" val="786217791"/>
+      </p:ext>
+    </p:extLst>
+  </p:cSld>
+  <p:clrMapOvr>
+    <a:masterClrMapping/>
+  </p:clrMapOvr>
+</p:sld>
+</file>
+
+<file path=ppt/slides/slide8.xml><?xml version="1.0" encoding="utf-8"?>
+<p:sld xmlns:a="http://schemas.openxmlformats.org/drawingml/2006/main" xmlns:r="http://schemas.openxmlformats.org/officeDocument/2006/relationships" xmlns:p="http://schemas.openxmlformats.org/presentationml/2006/main">
+  <p:cSld>
+    <p:spTree>
+      <p:nvGrpSpPr>
+        <p:cNvPr id="1" name=""/>
+        <p:cNvGrpSpPr/>
+        <p:nvPr/>
+      </p:nvGrpSpPr>
+      <p:grpSpPr>
+        <a:xfrm>
+          <a:off x="0" y="0"/>
+          <a:ext cx="0" cy="0"/>
+          <a:chOff x="0" y="0"/>
+          <a:chExt cx="0" cy="0"/>
+        </a:xfrm>
+      </p:grpSpPr>
+      <p:sp>
+        <p:nvSpPr>
+          <p:cNvPr id="2" name="TextShape 1">
+            <a:extLst>
+              <a:ext uri="{FF2B5EF4-FFF2-40B4-BE49-F238E27FC236}">
+                <a16:creationId xmlns:a16="http://schemas.microsoft.com/office/drawing/2014/main" id="{AB6E1F78-42FB-45C9-9C33-0A44858FC7D7}"/>
+              </a:ext>
+            </a:extLst>
+          </p:cNvPr>
+          <p:cNvSpPr txBox="1"/>
+          <p:nvPr/>
+        </p:nvSpPr>
+        <p:spPr>
+          <a:xfrm>
+            <a:off x="677160" y="609480"/>
+            <a:ext cx="8596440" cy="1320480"/>
+          </a:xfrm>
+          <a:prstGeom prst="rect">
+            <a:avLst/>
+          </a:prstGeom>
+          <a:noFill/>
+          <a:ln>
+            <a:noFill/>
+          </a:ln>
+        </p:spPr>
+        <p:txBody>
+          <a:bodyPr/>
+          <a:lstStyle/>
+          <a:p>
+            <a:pPr>
+              <a:lnSpc>
+                <a:spcPct val="100000"/>
+              </a:lnSpc>
+            </a:pPr>
+            <a:r>
+              <a:rPr lang="en-US" sz="3600" spc="-1" dirty="0">
+                <a:solidFill>
+                  <a:srgbClr val="90C226"/>
+                </a:solidFill>
+                <a:uFill>
+                  <a:solidFill>
+                    <a:srgbClr val="FFFFFF"/>
+                  </a:solidFill>
+                </a:uFill>
+              </a:rPr>
+              <a:t>Iteration 7</a:t>
+            </a:r>
+            <a:endParaRPr lang="en-US" sz="3600" spc="-1" dirty="0">
+              <a:solidFill>
+                <a:srgbClr val="000000"/>
+              </a:solidFill>
+              <a:uFill>
+                <a:solidFill>
+                  <a:srgbClr val="FFFFFF"/>
+                </a:solidFill>
+              </a:uFill>
+            </a:endParaRPr>
+          </a:p>
+        </p:txBody>
+      </p:sp>
+      <p:sp>
+        <p:nvSpPr>
+          <p:cNvPr id="3" name="TextShape 2">
+            <a:extLst>
+              <a:ext uri="{FF2B5EF4-FFF2-40B4-BE49-F238E27FC236}">
+                <a16:creationId xmlns:a16="http://schemas.microsoft.com/office/drawing/2014/main" id="{EE569319-2C74-4D43-B5FE-08E5C2434333}"/>
+              </a:ext>
+            </a:extLst>
+          </p:cNvPr>
+          <p:cNvSpPr txBox="1"/>
+          <p:nvPr/>
+        </p:nvSpPr>
+        <p:spPr>
+          <a:xfrm>
+            <a:off x="76212" y="1533814"/>
+            <a:ext cx="9798335" cy="3317962"/>
+          </a:xfrm>
+          <a:prstGeom prst="rect">
+            <a:avLst/>
+          </a:prstGeom>
+          <a:noFill/>
+          <a:ln>
+            <a:noFill/>
+          </a:ln>
+        </p:spPr>
+        <p:txBody>
+          <a:bodyPr>
+            <a:normAutofit/>
+          </a:bodyPr>
+          <a:lstStyle/>
+          <a:p>
+            <a:pPr marL="343080" indent="-342720">
+              <a:lnSpc>
+                <a:spcPct val="120000"/>
+              </a:lnSpc>
+              <a:spcBef>
+                <a:spcPts val="1001"/>
+              </a:spcBef>
+              <a:buClr>
+                <a:srgbClr val="90C226"/>
+              </a:buClr>
+              <a:buSzPct val="80000"/>
+              <a:buFont typeface="Wingdings 3" charset="2"/>
+              <a:buChar char=""/>
+            </a:pPr>
+            <a:r>
+              <a:rPr lang="en-US" spc="-1" dirty="0">
+                <a:solidFill>
+                  <a:srgbClr val="404040"/>
+                </a:solidFill>
+                <a:uFill>
+                  <a:solidFill>
+                    <a:srgbClr val="FFFFFF"/>
+                  </a:solidFill>
+                </a:uFill>
+              </a:rPr>
+              <a:t>Of the 7 iterations, Iteration 6 provides the largest boost of usability with a full fledged web interface. This web page, or set of pages, can provide	 the end	user the graphical representation of the current planter bed and all its LEDs. It also gives them full control of color, brightness, zoning, and scheduling, all within a few clicks. This iteration should take the remaining time left. If it turns out that it is completed early, the next set of iterations can be attempted.</a:t>
+            </a:r>
+            <a:endParaRPr lang="en-US" sz="1800" b="0" strike="noStrike" spc="-1" dirty="0">
+              <a:solidFill>
+                <a:srgbClr val="404040"/>
+              </a:solidFill>
+              <a:uFill>
+                <a:solidFill>
+                  <a:srgbClr val="FFFFFF"/>
+                </a:solidFill>
+              </a:uFill>
+              <a:latin typeface="Trebuchet MS"/>
+            </a:endParaRPr>
+          </a:p>
+        </p:txBody>
+      </p:sp>
+    </p:spTree>
+    <p:extLst>
+      <p:ext uri="{BB962C8B-B14F-4D97-AF65-F5344CB8AC3E}">
+        <p14:creationId xmlns:p14="http://schemas.microsoft.com/office/powerpoint/2010/main" val="1202314239"/>
+      </p:ext>
+    </p:extLst>
+  </p:cSld>
+  <p:clrMapOvr>
+    <a:masterClrMapping/>
+  </p:clrMapOvr>
+</p:sld>
+</file>
+
+<file path=ppt/slides/slide9.xml><?xml version="1.0" encoding="utf-8"?>
 <p:sld xmlns:a="http://schemas.openxmlformats.org/drawingml/2006/main" xmlns:r="http://schemas.openxmlformats.org/officeDocument/2006/relationships" xmlns:p="http://schemas.openxmlformats.org/presentationml/2006/main">
   <p:cSld>
     <p:spTree>

</xml_diff>